<commit_message>
Rasd Presentation final version + uploaded official release
</commit_message>
<xml_diff>
--- a/RASD/Presentation/RASD.pptx
+++ b/RASD/Presentation/RASD.pptx
@@ -6,26 +6,24 @@
     <p:sldMasterId id="2147483911" r:id="rId2"/>
   </p:sldMasterIdLst>
   <p:notesMasterIdLst>
-    <p:notesMasterId r:id="rId20"/>
+    <p:notesMasterId r:id="rId18"/>
   </p:notesMasterIdLst>
   <p:sldIdLst>
     <p:sldId id="256" r:id="rId3"/>
-    <p:sldId id="259" r:id="rId4"/>
-    <p:sldId id="275" r:id="rId5"/>
-    <p:sldId id="260" r:id="rId6"/>
-    <p:sldId id="272" r:id="rId7"/>
-    <p:sldId id="276" r:id="rId8"/>
-    <p:sldId id="258" r:id="rId9"/>
-    <p:sldId id="261" r:id="rId10"/>
-    <p:sldId id="262" r:id="rId11"/>
-    <p:sldId id="263" r:id="rId12"/>
-    <p:sldId id="264" r:id="rId13"/>
-    <p:sldId id="274" r:id="rId14"/>
-    <p:sldId id="273" r:id="rId15"/>
-    <p:sldId id="267" r:id="rId16"/>
-    <p:sldId id="268" r:id="rId17"/>
-    <p:sldId id="269" r:id="rId18"/>
-    <p:sldId id="270" r:id="rId19"/>
+    <p:sldId id="275" r:id="rId4"/>
+    <p:sldId id="260" r:id="rId5"/>
+    <p:sldId id="272" r:id="rId6"/>
+    <p:sldId id="276" r:id="rId7"/>
+    <p:sldId id="258" r:id="rId8"/>
+    <p:sldId id="261" r:id="rId9"/>
+    <p:sldId id="262" r:id="rId10"/>
+    <p:sldId id="263" r:id="rId11"/>
+    <p:sldId id="264" r:id="rId12"/>
+    <p:sldId id="274" r:id="rId13"/>
+    <p:sldId id="273" r:id="rId14"/>
+    <p:sldId id="268" r:id="rId15"/>
+    <p:sldId id="269" r:id="rId16"/>
+    <p:sldId id="270" r:id="rId17"/>
   </p:sldIdLst>
   <p:sldSz cx="12192000" cy="6858000"/>
   <p:notesSz cx="6858000" cy="9144000"/>
@@ -126,7 +124,18 @@
   </p:defaultTextStyle>
   <p:extLst>
     <p:ext uri="{EFAFB233-063F-42B5-8137-9DF3F51BA10A}">
-      <p15:sldGuideLst xmlns:p15="http://schemas.microsoft.com/office/powerpoint/2012/main" xmlns=""/>
+      <p15:sldGuideLst xmlns:p15="http://schemas.microsoft.com/office/powerpoint/2012/main">
+        <p15:guide id="1" orient="horz" pos="2160">
+          <p15:clr>
+            <a:srgbClr val="A4A3A4"/>
+          </p15:clr>
+        </p15:guide>
+        <p15:guide id="2" pos="3840">
+          <p15:clr>
+            <a:srgbClr val="A4A3A4"/>
+          </p15:clr>
+        </p15:guide>
+      </p15:sldGuideLst>
     </p:ext>
   </p:extLst>
 </p:presentation>
@@ -215,7 +224,7 @@
             <a:fld id="{FA4A621D-367F-4DA3-9671-02E004F6E4C1}" type="datetimeFigureOut">
               <a:rPr lang="it-IT" smtClean="0"/>
               <a:pPr/>
-              <a:t>06/11/2017</a:t>
+              <a:t>07/11/2017</a:t>
             </a:fld>
             <a:endParaRPr lang="it-IT"/>
           </a:p>
@@ -384,7 +393,7 @@
     </p:spTree>
     <p:extLst>
       <p:ext uri="{BB962C8B-B14F-4D97-AF65-F5344CB8AC3E}">
-        <p14:creationId xmlns:p14="http://schemas.microsoft.com/office/powerpoint/2010/main" xmlns="" val="37333255"/>
+        <p14:creationId xmlns:p14="http://schemas.microsoft.com/office/powerpoint/2010/main" val="37333255"/>
       </p:ext>
     </p:extLst>
   </p:cSld>
@@ -559,92 +568,7 @@
     </p:spTree>
     <p:extLst>
       <p:ext uri="{BB962C8B-B14F-4D97-AF65-F5344CB8AC3E}">
-        <p14:creationId xmlns:p14="http://schemas.microsoft.com/office/powerpoint/2010/main" xmlns="" val="1665066930"/>
-      </p:ext>
-    </p:extLst>
-  </p:cSld>
-  <p:clrMapOvr>
-    <a:masterClrMapping/>
-  </p:clrMapOvr>
-</p:notes>
-</file>
-
-<file path=ppt/notesSlides/notesSlide2.xml><?xml version="1.0" encoding="utf-8"?>
-<p:notes xmlns:a="http://schemas.openxmlformats.org/drawingml/2006/main" xmlns:r="http://schemas.openxmlformats.org/officeDocument/2006/relationships" xmlns:p="http://schemas.openxmlformats.org/presentationml/2006/main">
-  <p:cSld>
-    <p:spTree>
-      <p:nvGrpSpPr>
-        <p:cNvPr id="1" name=""/>
-        <p:cNvGrpSpPr/>
-        <p:nvPr/>
-      </p:nvGrpSpPr>
-      <p:grpSpPr>
-        <a:xfrm>
-          <a:off x="0" y="0"/>
-          <a:ext cx="0" cy="0"/>
-          <a:chOff x="0" y="0"/>
-          <a:chExt cx="0" cy="0"/>
-        </a:xfrm>
-      </p:grpSpPr>
-      <p:sp>
-        <p:nvSpPr>
-          <p:cNvPr id="2" name="Segnaposto immagine diapositiva 1"/>
-          <p:cNvSpPr>
-            <a:spLocks noGrp="1" noRot="1" noChangeAspect="1"/>
-          </p:cNvSpPr>
-          <p:nvPr>
-            <p:ph type="sldImg"/>
-          </p:nvPr>
-        </p:nvSpPr>
-        <p:spPr/>
-      </p:sp>
-      <p:sp>
-        <p:nvSpPr>
-          <p:cNvPr id="3" name="Segnaposto note 2"/>
-          <p:cNvSpPr>
-            <a:spLocks noGrp="1"/>
-          </p:cNvSpPr>
-          <p:nvPr>
-            <p:ph type="body" idx="1"/>
-          </p:nvPr>
-        </p:nvSpPr>
-        <p:spPr/>
-        <p:txBody>
-          <a:bodyPr/>
-          <a:lstStyle/>
-          <a:p>
-            <a:endParaRPr lang="it-IT"/>
-          </a:p>
-        </p:txBody>
-      </p:sp>
-      <p:sp>
-        <p:nvSpPr>
-          <p:cNvPr id="4" name="Segnaposto numero diapositiva 3"/>
-          <p:cNvSpPr>
-            <a:spLocks noGrp="1"/>
-          </p:cNvSpPr>
-          <p:nvPr>
-            <p:ph type="sldNum" sz="quarter" idx="10"/>
-          </p:nvPr>
-        </p:nvSpPr>
-        <p:spPr/>
-        <p:txBody>
-          <a:bodyPr/>
-          <a:lstStyle/>
-          <a:p>
-            <a:fld id="{932AFBF0-253E-4873-9876-7E283709A40E}" type="slidenum">
-              <a:rPr lang="it-IT" smtClean="0"/>
-              <a:pPr/>
-              <a:t>14</a:t>
-            </a:fld>
-            <a:endParaRPr lang="it-IT"/>
-          </a:p>
-        </p:txBody>
-      </p:sp>
-    </p:spTree>
-    <p:extLst>
-      <p:ext uri="{BB962C8B-B14F-4D97-AF65-F5344CB8AC3E}">
-        <p14:creationId xmlns:p14="http://schemas.microsoft.com/office/powerpoint/2010/main" xmlns="" val="1364471279"/>
+        <p14:creationId xmlns:p14="http://schemas.microsoft.com/office/powerpoint/2010/main" val="1665066930"/>
       </p:ext>
     </p:extLst>
   </p:cSld>
@@ -797,7 +721,7 @@
             <a:fld id="{9D105CC7-7899-4B59-BE11-2B089B40D129}" type="datetime1">
               <a:rPr lang="it-IT" smtClean="0"/>
               <a:pPr/>
-              <a:t>06/11/2017</a:t>
+              <a:t>07/11/2017</a:t>
             </a:fld>
             <a:endParaRPr lang="it-IT"/>
           </a:p>
@@ -849,7 +773,7 @@
     </p:spTree>
     <p:extLst>
       <p:ext uri="{BB962C8B-B14F-4D97-AF65-F5344CB8AC3E}">
-        <p14:creationId xmlns:p14="http://schemas.microsoft.com/office/powerpoint/2010/main" xmlns="" val="4265811806"/>
+        <p14:creationId xmlns:p14="http://schemas.microsoft.com/office/powerpoint/2010/main" val="4265811806"/>
       </p:ext>
     </p:extLst>
   </p:cSld>
@@ -969,7 +893,7 @@
             <a:fld id="{647E2937-CAF0-44DC-9BF0-AD55ADEA0590}" type="datetime1">
               <a:rPr lang="it-IT" smtClean="0"/>
               <a:pPr/>
-              <a:t>06/11/2017</a:t>
+              <a:t>07/11/2017</a:t>
             </a:fld>
             <a:endParaRPr lang="it-IT"/>
           </a:p>
@@ -1021,7 +945,7 @@
     </p:spTree>
     <p:extLst>
       <p:ext uri="{BB962C8B-B14F-4D97-AF65-F5344CB8AC3E}">
-        <p14:creationId xmlns:p14="http://schemas.microsoft.com/office/powerpoint/2010/main" xmlns="" val="3043008823"/>
+        <p14:creationId xmlns:p14="http://schemas.microsoft.com/office/powerpoint/2010/main" val="3043008823"/>
       </p:ext>
     </p:extLst>
   </p:cSld>
@@ -1151,7 +1075,7 @@
             <a:fld id="{A5FC554F-E2AC-4646-A6C6-90EE23361E38}" type="datetime1">
               <a:rPr lang="it-IT" smtClean="0"/>
               <a:pPr/>
-              <a:t>06/11/2017</a:t>
+              <a:t>07/11/2017</a:t>
             </a:fld>
             <a:endParaRPr lang="it-IT"/>
           </a:p>
@@ -1203,7 +1127,7 @@
     </p:spTree>
     <p:extLst>
       <p:ext uri="{BB962C8B-B14F-4D97-AF65-F5344CB8AC3E}">
-        <p14:creationId xmlns:p14="http://schemas.microsoft.com/office/powerpoint/2010/main" xmlns="" val="1699855774"/>
+        <p14:creationId xmlns:p14="http://schemas.microsoft.com/office/powerpoint/2010/main" val="1699855774"/>
       </p:ext>
     </p:extLst>
   </p:cSld>
@@ -1323,7 +1247,7 @@
             <a:fld id="{87DA325F-56CA-4BA4-926B-9B2104CED770}" type="datetime1">
               <a:rPr lang="it-IT" smtClean="0"/>
               <a:pPr/>
-              <a:t>06/11/2017</a:t>
+              <a:t>07/11/2017</a:t>
             </a:fld>
             <a:endParaRPr lang="it-IT"/>
           </a:p>
@@ -1375,7 +1299,7 @@
     </p:spTree>
     <p:extLst>
       <p:ext uri="{BB962C8B-B14F-4D97-AF65-F5344CB8AC3E}">
-        <p14:creationId xmlns:p14="http://schemas.microsoft.com/office/powerpoint/2010/main" xmlns="" val="2592741038"/>
+        <p14:creationId xmlns:p14="http://schemas.microsoft.com/office/powerpoint/2010/main" val="2592741038"/>
       </p:ext>
     </p:extLst>
   </p:cSld>
@@ -1619,7 +1543,7 @@
             <a:fld id="{80459A53-B729-4631-9578-6E34EFFC3466}" type="datetime1">
               <a:rPr lang="it-IT" smtClean="0"/>
               <a:pPr/>
-              <a:t>06/11/2017</a:t>
+              <a:t>07/11/2017</a:t>
             </a:fld>
             <a:endParaRPr lang="it-IT"/>
           </a:p>
@@ -1709,7 +1633,7 @@
     </p:spTree>
     <p:extLst>
       <p:ext uri="{BB962C8B-B14F-4D97-AF65-F5344CB8AC3E}">
-        <p14:creationId xmlns:p14="http://schemas.microsoft.com/office/powerpoint/2010/main" xmlns="" val="2068594274"/>
+        <p14:creationId xmlns:p14="http://schemas.microsoft.com/office/powerpoint/2010/main" val="2068594274"/>
       </p:ext>
     </p:extLst>
   </p:cSld>
@@ -1853,7 +1777,7 @@
             <a:fld id="{FCE63AC6-737D-48A7-8280-F606E77FDD59}" type="datetime1">
               <a:rPr lang="it-IT" smtClean="0"/>
               <a:pPr/>
-              <a:t>06/11/2017</a:t>
+              <a:t>07/11/2017</a:t>
             </a:fld>
             <a:endParaRPr lang="it-IT"/>
           </a:p>
@@ -1905,7 +1829,7 @@
     </p:spTree>
     <p:extLst>
       <p:ext uri="{BB962C8B-B14F-4D97-AF65-F5344CB8AC3E}">
-        <p14:creationId xmlns:p14="http://schemas.microsoft.com/office/powerpoint/2010/main" xmlns="" val="3466604563"/>
+        <p14:creationId xmlns:p14="http://schemas.microsoft.com/office/powerpoint/2010/main" val="3466604563"/>
       </p:ext>
     </p:extLst>
   </p:cSld>
@@ -2205,7 +2129,7 @@
             <a:fld id="{46381BD7-5024-43E3-BA86-D305B69515D9}" type="datetime1">
               <a:rPr lang="it-IT" smtClean="0"/>
               <a:pPr/>
-              <a:t>06/11/2017</a:t>
+              <a:t>07/11/2017</a:t>
             </a:fld>
             <a:endParaRPr lang="it-IT"/>
           </a:p>
@@ -2295,7 +2219,7 @@
     </p:spTree>
     <p:extLst>
       <p:ext uri="{BB962C8B-B14F-4D97-AF65-F5344CB8AC3E}">
-        <p14:creationId xmlns:p14="http://schemas.microsoft.com/office/powerpoint/2010/main" xmlns="" val="2922783602"/>
+        <p14:creationId xmlns:p14="http://schemas.microsoft.com/office/powerpoint/2010/main" val="2922783602"/>
       </p:ext>
     </p:extLst>
   </p:cSld>
@@ -2497,7 +2421,7 @@
             <a:fld id="{B7E4C089-161D-45F9-BA3B-DF005531779B}" type="datetime1">
               <a:rPr lang="it-IT" smtClean="0"/>
               <a:pPr/>
-              <a:t>06/11/2017</a:t>
+              <a:t>07/11/2017</a:t>
             </a:fld>
             <a:endParaRPr lang="it-IT"/>
           </a:p>
@@ -2549,7 +2473,7 @@
     </p:spTree>
     <p:extLst>
       <p:ext uri="{BB962C8B-B14F-4D97-AF65-F5344CB8AC3E}">
-        <p14:creationId xmlns:p14="http://schemas.microsoft.com/office/powerpoint/2010/main" xmlns="" val="367268170"/>
+        <p14:creationId xmlns:p14="http://schemas.microsoft.com/office/powerpoint/2010/main" val="367268170"/>
       </p:ext>
     </p:extLst>
   </p:cSld>
@@ -2893,7 +2817,7 @@
             <a:fld id="{3683A939-33A9-471E-AF12-946DC792434E}" type="datetime1">
               <a:rPr lang="it-IT" smtClean="0"/>
               <a:pPr/>
-              <a:t>06/11/2017</a:t>
+              <a:t>07/11/2017</a:t>
             </a:fld>
             <a:endParaRPr lang="it-IT"/>
           </a:p>
@@ -2945,7 +2869,7 @@
     </p:spTree>
     <p:extLst>
       <p:ext uri="{BB962C8B-B14F-4D97-AF65-F5344CB8AC3E}">
-        <p14:creationId xmlns:p14="http://schemas.microsoft.com/office/powerpoint/2010/main" xmlns="" val="3924864121"/>
+        <p14:creationId xmlns:p14="http://schemas.microsoft.com/office/powerpoint/2010/main" val="3924864121"/>
       </p:ext>
     </p:extLst>
   </p:cSld>
@@ -3020,7 +2944,7 @@
             <a:fld id="{AB6CCB7F-C2E0-40CF-A792-E40DB12DB317}" type="datetime1">
               <a:rPr lang="it-IT" smtClean="0"/>
               <a:pPr/>
-              <a:t>06/11/2017</a:t>
+              <a:t>07/11/2017</a:t>
             </a:fld>
             <a:endParaRPr lang="it-IT"/>
           </a:p>
@@ -3072,7 +2996,7 @@
     </p:spTree>
     <p:extLst>
       <p:ext uri="{BB962C8B-B14F-4D97-AF65-F5344CB8AC3E}">
-        <p14:creationId xmlns:p14="http://schemas.microsoft.com/office/powerpoint/2010/main" xmlns="" val="4191900184"/>
+        <p14:creationId xmlns:p14="http://schemas.microsoft.com/office/powerpoint/2010/main" val="4191900184"/>
       </p:ext>
     </p:extLst>
   </p:cSld>
@@ -3200,7 +3124,7 @@
             <a:fld id="{9FF02910-BDD5-4159-A0F2-090EBAA7031D}" type="datetime1">
               <a:rPr lang="it-IT" smtClean="0"/>
               <a:pPr/>
-              <a:t>06/11/2017</a:t>
+              <a:t>07/11/2017</a:t>
             </a:fld>
             <a:endParaRPr lang="it-IT"/>
           </a:p>
@@ -3260,7 +3184,7 @@
     </p:spTree>
     <p:extLst>
       <p:ext uri="{BB962C8B-B14F-4D97-AF65-F5344CB8AC3E}">
-        <p14:creationId xmlns:p14="http://schemas.microsoft.com/office/powerpoint/2010/main" xmlns="" val="2782333850"/>
+        <p14:creationId xmlns:p14="http://schemas.microsoft.com/office/powerpoint/2010/main" val="2782333850"/>
       </p:ext>
     </p:extLst>
   </p:cSld>
@@ -3380,7 +3304,7 @@
             <a:fld id="{30C713B8-A50E-4D94-B3AB-8A0A685D38CA}" type="datetime1">
               <a:rPr lang="it-IT" smtClean="0"/>
               <a:pPr/>
-              <a:t>06/11/2017</a:t>
+              <a:t>07/11/2017</a:t>
             </a:fld>
             <a:endParaRPr lang="it-IT"/>
           </a:p>
@@ -3432,7 +3356,7 @@
     </p:spTree>
     <p:extLst>
       <p:ext uri="{BB962C8B-B14F-4D97-AF65-F5344CB8AC3E}">
-        <p14:creationId xmlns:p14="http://schemas.microsoft.com/office/powerpoint/2010/main" xmlns="" val="785073886"/>
+        <p14:creationId xmlns:p14="http://schemas.microsoft.com/office/powerpoint/2010/main" val="785073886"/>
       </p:ext>
     </p:extLst>
   </p:cSld>
@@ -3728,7 +3652,7 @@
             <a:fld id="{9189832A-28F4-442B-AC77-C9BD231C58B3}" type="datetime1">
               <a:rPr lang="it-IT" smtClean="0"/>
               <a:pPr/>
-              <a:t>06/11/2017</a:t>
+              <a:t>07/11/2017</a:t>
             </a:fld>
             <a:endParaRPr lang="it-IT"/>
           </a:p>
@@ -3801,7 +3725,7 @@
     </p:spTree>
     <p:extLst>
       <p:ext uri="{BB962C8B-B14F-4D97-AF65-F5344CB8AC3E}">
-        <p14:creationId xmlns:p14="http://schemas.microsoft.com/office/powerpoint/2010/main" xmlns="" val="4209511215"/>
+        <p14:creationId xmlns:p14="http://schemas.microsoft.com/office/powerpoint/2010/main" val="4209511215"/>
       </p:ext>
     </p:extLst>
   </p:cSld>
@@ -4112,7 +4036,7 @@
             <a:fld id="{C9687EDC-E1EF-477C-9131-0EB83AD68B4D}" type="datetime1">
               <a:rPr lang="it-IT" smtClean="0"/>
               <a:pPr/>
-              <a:t>06/11/2017</a:t>
+              <a:t>07/11/2017</a:t>
             </a:fld>
             <a:endParaRPr lang="it-IT"/>
           </a:p>
@@ -4164,7 +4088,7 @@
     </p:spTree>
     <p:extLst>
       <p:ext uri="{BB962C8B-B14F-4D97-AF65-F5344CB8AC3E}">
-        <p14:creationId xmlns:p14="http://schemas.microsoft.com/office/powerpoint/2010/main" xmlns="" val="2943880728"/>
+        <p14:creationId xmlns:p14="http://schemas.microsoft.com/office/powerpoint/2010/main" val="2943880728"/>
       </p:ext>
     </p:extLst>
   </p:cSld>
@@ -4284,7 +4208,7 @@
             <a:fld id="{506DD563-1CA9-4C92-8788-3AEA719E5784}" type="datetime1">
               <a:rPr lang="it-IT" smtClean="0"/>
               <a:pPr/>
-              <a:t>06/11/2017</a:t>
+              <a:t>07/11/2017</a:t>
             </a:fld>
             <a:endParaRPr lang="it-IT"/>
           </a:p>
@@ -4336,7 +4260,7 @@
     </p:spTree>
     <p:extLst>
       <p:ext uri="{BB962C8B-B14F-4D97-AF65-F5344CB8AC3E}">
-        <p14:creationId xmlns:p14="http://schemas.microsoft.com/office/powerpoint/2010/main" xmlns="" val="2224474173"/>
+        <p14:creationId xmlns:p14="http://schemas.microsoft.com/office/powerpoint/2010/main" val="2224474173"/>
       </p:ext>
     </p:extLst>
   </p:cSld>
@@ -4542,7 +4466,7 @@
             <a:fld id="{5D28B4BE-EFC6-4DDA-8F05-D07E7FADDB5D}" type="datetime1">
               <a:rPr lang="it-IT" smtClean="0"/>
               <a:pPr/>
-              <a:t>06/11/2017</a:t>
+              <a:t>07/11/2017</a:t>
             </a:fld>
             <a:endParaRPr lang="it-IT"/>
           </a:p>
@@ -4594,7 +4518,7 @@
     </p:spTree>
     <p:extLst>
       <p:ext uri="{BB962C8B-B14F-4D97-AF65-F5344CB8AC3E}">
-        <p14:creationId xmlns:p14="http://schemas.microsoft.com/office/powerpoint/2010/main" xmlns="" val="1051588964"/>
+        <p14:creationId xmlns:p14="http://schemas.microsoft.com/office/powerpoint/2010/main" val="1051588964"/>
       </p:ext>
     </p:extLst>
   </p:cSld>
@@ -4795,7 +4719,7 @@
             <a:fld id="{3C0E6AB7-B836-42E5-AACD-39F960C1600A}" type="datetime1">
               <a:rPr lang="it-IT" smtClean="0"/>
               <a:pPr/>
-              <a:t>06/11/2017</a:t>
+              <a:t>07/11/2017</a:t>
             </a:fld>
             <a:endParaRPr lang="it-IT"/>
           </a:p>
@@ -4847,7 +4771,7 @@
     </p:spTree>
     <p:extLst>
       <p:ext uri="{BB962C8B-B14F-4D97-AF65-F5344CB8AC3E}">
-        <p14:creationId xmlns:p14="http://schemas.microsoft.com/office/powerpoint/2010/main" xmlns="" val="1681189979"/>
+        <p14:creationId xmlns:p14="http://schemas.microsoft.com/office/powerpoint/2010/main" val="1681189979"/>
       </p:ext>
     </p:extLst>
   </p:cSld>
@@ -5029,7 +4953,7 @@
             <a:fld id="{AAC911C8-BDAA-4101-887B-FBB7DA549EF9}" type="datetime1">
               <a:rPr lang="it-IT" smtClean="0"/>
               <a:pPr/>
-              <a:t>06/11/2017</a:t>
+              <a:t>07/11/2017</a:t>
             </a:fld>
             <a:endParaRPr lang="it-IT"/>
           </a:p>
@@ -5081,7 +5005,7 @@
     </p:spTree>
     <p:extLst>
       <p:ext uri="{BB962C8B-B14F-4D97-AF65-F5344CB8AC3E}">
-        <p14:creationId xmlns:p14="http://schemas.microsoft.com/office/powerpoint/2010/main" xmlns="" val="114904563"/>
+        <p14:creationId xmlns:p14="http://schemas.microsoft.com/office/powerpoint/2010/main" val="114904563"/>
       </p:ext>
     </p:extLst>
   </p:cSld>
@@ -5378,7 +5302,7 @@
             <a:fld id="{B6B7C24E-B844-492D-8560-663CA5C85E96}" type="datetime1">
               <a:rPr lang="it-IT" smtClean="0"/>
               <a:pPr/>
-              <a:t>06/11/2017</a:t>
+              <a:t>07/11/2017</a:t>
             </a:fld>
             <a:endParaRPr lang="it-IT"/>
           </a:p>
@@ -5453,7 +5377,7 @@
     </p:spTree>
     <p:extLst>
       <p:ext uri="{BB962C8B-B14F-4D97-AF65-F5344CB8AC3E}">
-        <p14:creationId xmlns:p14="http://schemas.microsoft.com/office/powerpoint/2010/main" xmlns="" val="1436637925"/>
+        <p14:creationId xmlns:p14="http://schemas.microsoft.com/office/powerpoint/2010/main" val="1436637925"/>
       </p:ext>
     </p:extLst>
   </p:cSld>
@@ -5498,7 +5422,7 @@
             <a:fld id="{C978F49D-458F-44B0-AF94-C7301464F4D0}" type="datetime1">
               <a:rPr lang="it-IT" smtClean="0"/>
               <a:pPr/>
-              <a:t>06/11/2017</a:t>
+              <a:t>07/11/2017</a:t>
             </a:fld>
             <a:endParaRPr lang="it-IT"/>
           </a:p>
@@ -5573,7 +5497,7 @@
     </p:spTree>
     <p:extLst>
       <p:ext uri="{BB962C8B-B14F-4D97-AF65-F5344CB8AC3E}">
-        <p14:creationId xmlns:p14="http://schemas.microsoft.com/office/powerpoint/2010/main" xmlns="" val="3511077541"/>
+        <p14:creationId xmlns:p14="http://schemas.microsoft.com/office/powerpoint/2010/main" val="3511077541"/>
       </p:ext>
     </p:extLst>
   </p:cSld>
@@ -5618,7 +5542,7 @@
             <a:fld id="{44FCB24D-6691-4AA5-849D-EDDFD36C3E4C}" type="datetime1">
               <a:rPr lang="it-IT" smtClean="0"/>
               <a:pPr/>
-              <a:t>06/11/2017</a:t>
+              <a:t>07/11/2017</a:t>
             </a:fld>
             <a:endParaRPr lang="it-IT"/>
           </a:p>
@@ -5670,7 +5594,7 @@
     </p:spTree>
     <p:extLst>
       <p:ext uri="{BB962C8B-B14F-4D97-AF65-F5344CB8AC3E}">
-        <p14:creationId xmlns:p14="http://schemas.microsoft.com/office/powerpoint/2010/main" xmlns="" val="3620235441"/>
+        <p14:creationId xmlns:p14="http://schemas.microsoft.com/office/powerpoint/2010/main" val="3620235441"/>
       </p:ext>
     </p:extLst>
   </p:cSld>
@@ -5904,7 +5828,7 @@
             <a:fld id="{88B8E2DA-5937-402D-A569-430A65C27FC9}" type="datetime1">
               <a:rPr lang="it-IT" smtClean="0"/>
               <a:pPr/>
-              <a:t>06/11/2017</a:t>
+              <a:t>07/11/2017</a:t>
             </a:fld>
             <a:endParaRPr lang="it-IT"/>
           </a:p>
@@ -5956,7 +5880,7 @@
     </p:spTree>
     <p:extLst>
       <p:ext uri="{BB962C8B-B14F-4D97-AF65-F5344CB8AC3E}">
-        <p14:creationId xmlns:p14="http://schemas.microsoft.com/office/powerpoint/2010/main" xmlns="" val="3939158745"/>
+        <p14:creationId xmlns:p14="http://schemas.microsoft.com/office/powerpoint/2010/main" val="3939158745"/>
       </p:ext>
     </p:extLst>
   </p:cSld>
@@ -6170,7 +6094,7 @@
             <a:fld id="{F535A2FC-1B9F-4809-BB1B-3D6D17076C7D}" type="datetime1">
               <a:rPr lang="it-IT" smtClean="0"/>
               <a:pPr/>
-              <a:t>06/11/2017</a:t>
+              <a:t>07/11/2017</a:t>
             </a:fld>
             <a:endParaRPr lang="it-IT"/>
           </a:p>
@@ -6222,7 +6146,7 @@
     </p:spTree>
     <p:extLst>
       <p:ext uri="{BB962C8B-B14F-4D97-AF65-F5344CB8AC3E}">
-        <p14:creationId xmlns:p14="http://schemas.microsoft.com/office/powerpoint/2010/main" xmlns="" val="2690128312"/>
+        <p14:creationId xmlns:p14="http://schemas.microsoft.com/office/powerpoint/2010/main" val="2690128312"/>
       </p:ext>
     </p:extLst>
   </p:cSld>
@@ -6386,7 +6310,7 @@
             <a:fld id="{B924DD9B-70E2-497B-900D-17F0C351CB17}" type="datetime1">
               <a:rPr lang="it-IT" smtClean="0"/>
               <a:pPr/>
-              <a:t>06/11/2017</a:t>
+              <a:t>07/11/2017</a:t>
             </a:fld>
             <a:endParaRPr lang="it-IT"/>
           </a:p>
@@ -6475,7 +6399,7 @@
     </p:spTree>
     <p:extLst>
       <p:ext uri="{BB962C8B-B14F-4D97-AF65-F5344CB8AC3E}">
-        <p14:creationId xmlns:p14="http://schemas.microsoft.com/office/powerpoint/2010/main" xmlns="" val="2779141682"/>
+        <p14:creationId xmlns:p14="http://schemas.microsoft.com/office/powerpoint/2010/main" val="2779141682"/>
       </p:ext>
     </p:extLst>
   </p:cSld>
@@ -6993,7 +6917,7 @@
             <a:fld id="{BBAA8976-DA0A-4A91-96D1-D23211FE915E}" type="datetime1">
               <a:rPr lang="it-IT" smtClean="0"/>
               <a:pPr/>
-              <a:t>06/11/2017</a:t>
+              <a:t>07/11/2017</a:t>
             </a:fld>
             <a:endParaRPr lang="it-IT"/>
           </a:p>
@@ -7115,7 +7039,7 @@
     </p:spTree>
     <p:extLst>
       <p:ext uri="{BB962C8B-B14F-4D97-AF65-F5344CB8AC3E}">
-        <p14:creationId xmlns:p14="http://schemas.microsoft.com/office/powerpoint/2010/main" xmlns="" val="28042715"/>
+        <p14:creationId xmlns:p14="http://schemas.microsoft.com/office/powerpoint/2010/main" val="28042715"/>
       </p:ext>
     </p:extLst>
   </p:cSld>
@@ -7587,7 +7511,7 @@
     </p:spTree>
     <p:extLst>
       <p:ext uri="{BB962C8B-B14F-4D97-AF65-F5344CB8AC3E}">
-        <p14:creationId xmlns:p14="http://schemas.microsoft.com/office/powerpoint/2010/main" xmlns="" val="4125957607"/>
+        <p14:creationId xmlns:p14="http://schemas.microsoft.com/office/powerpoint/2010/main" val="4125957607"/>
       </p:ext>
     </p:extLst>
   </p:cSld>
@@ -7623,7 +7547,126 @@
       </p:grpSpPr>
       <p:sp>
         <p:nvSpPr>
-          <p:cNvPr id="5" name="Segnaposto numero diapositiva 4"/>
+          <p:cNvPr id="2" name="Titolo 1"/>
+          <p:cNvSpPr>
+            <a:spLocks noGrp="1"/>
+          </p:cNvSpPr>
+          <p:nvPr>
+            <p:ph type="title"/>
+          </p:nvPr>
+        </p:nvSpPr>
+        <p:spPr>
+          <a:xfrm>
+            <a:off x="0" y="-468000"/>
+            <a:ext cx="12192000" cy="1451664"/>
+          </a:xfrm>
+        </p:spPr>
+        <p:txBody>
+          <a:bodyPr>
+            <a:normAutofit/>
+          </a:bodyPr>
+          <a:lstStyle/>
+          <a:p>
+            <a:pPr algn="ctr"/>
+            <a:r>
+              <a:rPr lang="en-US" dirty="0" smtClean="0"/>
+              <a:t>Manage users’ travels</a:t>
+            </a:r>
+            <a:endParaRPr lang="it-IT" dirty="0"/>
+          </a:p>
+        </p:txBody>
+      </p:sp>
+      <p:sp>
+        <p:nvSpPr>
+          <p:cNvPr id="3" name="Segnaposto contenuto 2"/>
+          <p:cNvSpPr>
+            <a:spLocks noGrp="1"/>
+          </p:cNvSpPr>
+          <p:nvPr>
+            <p:ph idx="1"/>
+          </p:nvPr>
+        </p:nvSpPr>
+        <p:spPr>
+          <a:xfrm>
+            <a:off x="1097280" y="1546578"/>
+            <a:ext cx="10058400" cy="4685972"/>
+          </a:xfrm>
+        </p:spPr>
+        <p:txBody>
+          <a:bodyPr>
+            <a:normAutofit/>
+          </a:bodyPr>
+          <a:lstStyle/>
+          <a:p>
+            <a:r>
+              <a:rPr lang="en-US" dirty="0" smtClean="0"/>
+              <a:t> </a:t>
+            </a:r>
+            <a:r>
+              <a:rPr lang="en-US" dirty="0"/>
+              <a:t>[D5] Each user has at least one default location.</a:t>
+            </a:r>
+          </a:p>
+          <a:p>
+            <a:r>
+              <a:rPr lang="en-US" dirty="0"/>
+              <a:t> [D7] Each user has a preference list.</a:t>
+            </a:r>
+          </a:p>
+          <a:p>
+            <a:r>
+              <a:rPr lang="en-US" dirty="0"/>
+              <a:t> [D8] All users always have a position.</a:t>
+            </a:r>
+          </a:p>
+          <a:p>
+            <a:r>
+              <a:rPr lang="en-US" dirty="0"/>
+              <a:t> [D9] External shortest path provider is always able to retrieve a path between any two locations.</a:t>
+            </a:r>
+          </a:p>
+          <a:p>
+            <a:r>
+              <a:rPr lang="en-US" dirty="0"/>
+              <a:t> [D10] Each user is always able to communicate with our servers.</a:t>
+            </a:r>
+          </a:p>
+          <a:p>
+            <a:r>
+              <a:rPr lang="en-US" dirty="0"/>
+              <a:t> [D11] The system does not differentiate between a travel mean that is shared and one that </a:t>
+            </a:r>
+            <a:r>
+              <a:rPr lang="en-US" dirty="0" smtClean="0"/>
+              <a:t>is </a:t>
+            </a:r>
+            <a:r>
+              <a:rPr lang="it-IT" dirty="0" err="1" smtClean="0"/>
+              <a:t>owned</a:t>
+            </a:r>
+            <a:r>
+              <a:rPr lang="it-IT" dirty="0"/>
+              <a:t>.</a:t>
+            </a:r>
+          </a:p>
+          <a:p>
+            <a:r>
+              <a:rPr lang="en-US" dirty="0"/>
+              <a:t> [D12] The system treats the taxis as a driving travel mean and not as public transportation.</a:t>
+            </a:r>
+          </a:p>
+          <a:p>
+            <a:r>
+              <a:rPr lang="en-US" dirty="0"/>
+              <a:t> [D13] If a user accepts the invitation to a meeting, then he really attends to it.</a:t>
+            </a:r>
+            <a:endParaRPr lang="it-IT" dirty="0"/>
+          </a:p>
+        </p:txBody>
+      </p:sp>
+      <p:sp>
+        <p:nvSpPr>
+          <p:cNvPr id="7" name="Segnaposto numero diapositiva 6"/>
           <p:cNvSpPr>
             <a:spLocks noGrp="1"/>
           </p:cNvSpPr>
@@ -7645,110 +7688,10 @@
           </a:p>
         </p:txBody>
       </p:sp>
-      <p:sp>
-        <p:nvSpPr>
-          <p:cNvPr id="8" name="Titolo 7"/>
-          <p:cNvSpPr>
-            <a:spLocks noGrp="1"/>
-          </p:cNvSpPr>
-          <p:nvPr>
-            <p:ph type="title"/>
-          </p:nvPr>
-        </p:nvSpPr>
-        <p:spPr>
-          <a:xfrm>
-            <a:off x="0" y="-468000"/>
-            <a:ext cx="12192000" cy="1450757"/>
-          </a:xfrm>
-        </p:spPr>
-        <p:txBody>
-          <a:bodyPr>
-            <a:normAutofit/>
-          </a:bodyPr>
-          <a:lstStyle/>
-          <a:p>
-            <a:pPr algn="ctr"/>
-            <a:r>
-              <a:rPr lang="en-US" dirty="0"/>
-              <a:t>Manage users’ </a:t>
-            </a:r>
-            <a:r>
-              <a:rPr lang="en-US" dirty="0" smtClean="0"/>
-              <a:t>travels</a:t>
-            </a:r>
-            <a:endParaRPr lang="it-IT" dirty="0"/>
-          </a:p>
-        </p:txBody>
-      </p:sp>
-      <p:sp>
-        <p:nvSpPr>
-          <p:cNvPr id="9" name="Segnaposto contenuto 8"/>
-          <p:cNvSpPr>
-            <a:spLocks noGrp="1"/>
-          </p:cNvSpPr>
-          <p:nvPr>
-            <p:ph idx="1"/>
-          </p:nvPr>
-        </p:nvSpPr>
-        <p:spPr>
-          <a:xfrm>
-            <a:off x="1097280" y="1873955"/>
-            <a:ext cx="10058400" cy="4358593"/>
-          </a:xfrm>
-        </p:spPr>
-        <p:txBody>
-          <a:bodyPr/>
-          <a:lstStyle/>
-          <a:p>
-            <a:r>
-              <a:rPr lang="en-US" dirty="0" smtClean="0"/>
-              <a:t> G8.1 </a:t>
-            </a:r>
-            <a:r>
-              <a:rPr lang="en-US" dirty="0"/>
-              <a:t>Allow a user to create a preference list and constraints about the way he wants to travel.</a:t>
-            </a:r>
-          </a:p>
-          <a:p>
-            <a:endParaRPr lang="en-US" dirty="0"/>
-          </a:p>
-          <a:p>
-            <a:r>
-              <a:rPr lang="en-US" dirty="0"/>
-              <a:t> [R5] A user must be logged into the system to perform any action except registering and </a:t>
-            </a:r>
-            <a:r>
-              <a:rPr lang="it-IT" dirty="0" err="1"/>
-              <a:t>logging</a:t>
-            </a:r>
-            <a:r>
-              <a:rPr lang="it-IT" dirty="0"/>
-              <a:t> in.</a:t>
-            </a:r>
-          </a:p>
-          <a:p>
-            <a:r>
-              <a:rPr lang="en-US" dirty="0"/>
-              <a:t> [R19] At least one travel mean is available in the preference list.</a:t>
-            </a:r>
-          </a:p>
-          <a:p>
-            <a:r>
-              <a:rPr lang="en-US" dirty="0"/>
-              <a:t> [R20] The travel mean suggested by the system is always the first in the weighted preference list that satisfied all the constraints; if no travel mean satisfied all the constraints than the system suggests the fastest one</a:t>
-            </a:r>
-            <a:r>
-              <a:rPr lang="en-US" dirty="0" smtClean="0"/>
-              <a:t>.</a:t>
-            </a:r>
-            <a:endParaRPr lang="en-US" dirty="0"/>
-          </a:p>
-        </p:txBody>
-      </p:sp>
     </p:spTree>
     <p:extLst>
       <p:ext uri="{BB962C8B-B14F-4D97-AF65-F5344CB8AC3E}">
-        <p14:creationId xmlns:p14="http://schemas.microsoft.com/office/powerpoint/2010/main" xmlns="" val="2407907090"/>
+        <p14:creationId xmlns:p14="http://schemas.microsoft.com/office/powerpoint/2010/main" val="2214369682"/>
       </p:ext>
     </p:extLst>
   </p:cSld>
@@ -7792,26 +7735,23 @@
             <p:ph type="title"/>
           </p:nvPr>
         </p:nvSpPr>
-        <p:spPr>
-          <a:xfrm>
-            <a:off x="0" y="-468000"/>
-            <a:ext cx="12192000" cy="1451664"/>
-          </a:xfrm>
-        </p:spPr>
-        <p:txBody>
-          <a:bodyPr>
-            <a:normAutofit/>
-          </a:bodyPr>
+        <p:spPr/>
+        <p:txBody>
+          <a:bodyPr/>
           <a:lstStyle/>
           <a:p>
             <a:pPr algn="ctr"/>
             <a:r>
-              <a:rPr lang="en-US" dirty="0" smtClean="0"/>
-              <a:t>Manage users’ </a:t>
-            </a:r>
-            <a:r>
-              <a:rPr lang="en-US" dirty="0" smtClean="0"/>
-              <a:t>travels</a:t>
+              <a:rPr lang="it-IT" dirty="0" err="1" smtClean="0"/>
+              <a:t>Mockup</a:t>
+            </a:r>
+            <a:r>
+              <a:rPr lang="it-IT" dirty="0" smtClean="0"/>
+              <a:t> - </a:t>
+            </a:r>
+            <a:r>
+              <a:rPr lang="it-IT" dirty="0" err="1" smtClean="0"/>
+              <a:t>Calendar</a:t>
             </a:r>
             <a:endParaRPr lang="it-IT" dirty="0"/>
           </a:p>
@@ -7819,95 +7759,7 @@
       </p:sp>
       <p:sp>
         <p:nvSpPr>
-          <p:cNvPr id="3" name="Segnaposto contenuto 2"/>
-          <p:cNvSpPr>
-            <a:spLocks noGrp="1"/>
-          </p:cNvSpPr>
-          <p:nvPr>
-            <p:ph idx="1"/>
-          </p:nvPr>
-        </p:nvSpPr>
-        <p:spPr>
-          <a:xfrm>
-            <a:off x="1097280" y="1546578"/>
-            <a:ext cx="10058400" cy="4685972"/>
-          </a:xfrm>
-        </p:spPr>
-        <p:txBody>
-          <a:bodyPr>
-            <a:normAutofit/>
-          </a:bodyPr>
-          <a:lstStyle/>
-          <a:p>
-            <a:r>
-              <a:rPr lang="en-US" dirty="0" smtClean="0"/>
-              <a:t> </a:t>
-            </a:r>
-            <a:r>
-              <a:rPr lang="en-US" dirty="0"/>
-              <a:t>[D5] Each user has at least one default location.</a:t>
-            </a:r>
-          </a:p>
-          <a:p>
-            <a:r>
-              <a:rPr lang="en-US" dirty="0"/>
-              <a:t> [D7] Each user has a preference list.</a:t>
-            </a:r>
-          </a:p>
-          <a:p>
-            <a:r>
-              <a:rPr lang="en-US" dirty="0"/>
-              <a:t> [D8] All users always have a position.</a:t>
-            </a:r>
-          </a:p>
-          <a:p>
-            <a:r>
-              <a:rPr lang="en-US" dirty="0"/>
-              <a:t> [D9] External shortest path provider is always able to retrieve a path between any two locations.</a:t>
-            </a:r>
-          </a:p>
-          <a:p>
-            <a:r>
-              <a:rPr lang="en-US" dirty="0"/>
-              <a:t> [D10] Each user is always able to communicate with our servers.</a:t>
-            </a:r>
-          </a:p>
-          <a:p>
-            <a:r>
-              <a:rPr lang="en-US" dirty="0"/>
-              <a:t> [D11] The system does not differentiate between a travel mean that is shared and one that </a:t>
-            </a:r>
-            <a:r>
-              <a:rPr lang="en-US" dirty="0" smtClean="0"/>
-              <a:t>is </a:t>
-            </a:r>
-            <a:r>
-              <a:rPr lang="it-IT" dirty="0" err="1" smtClean="0"/>
-              <a:t>owned</a:t>
-            </a:r>
-            <a:r>
-              <a:rPr lang="it-IT" dirty="0"/>
-              <a:t>.</a:t>
-            </a:r>
-          </a:p>
-          <a:p>
-            <a:r>
-              <a:rPr lang="en-US" dirty="0"/>
-              <a:t> [D12] The system treats the taxis as a driving travel mean and not as public transportation.</a:t>
-            </a:r>
-          </a:p>
-          <a:p>
-            <a:r>
-              <a:rPr lang="en-US" dirty="0"/>
-              <a:t> [D13] If a user accepts the invitation to a meeting, then he really attends to it.</a:t>
-            </a:r>
-            <a:endParaRPr lang="it-IT" dirty="0"/>
-          </a:p>
-        </p:txBody>
-      </p:sp>
-      <p:sp>
-        <p:nvSpPr>
-          <p:cNvPr id="7" name="Segnaposto numero diapositiva 6"/>
+          <p:cNvPr id="3" name="Segnaposto numero diapositiva 2"/>
           <p:cNvSpPr>
             <a:spLocks noGrp="1"/>
           </p:cNvSpPr>
@@ -7924,99 +7776,6 @@
               <a:rPr lang="it-IT" smtClean="0"/>
               <a:pPr/>
               <a:t>11</a:t>
-            </a:fld>
-            <a:endParaRPr lang="it-IT"/>
-          </a:p>
-        </p:txBody>
-      </p:sp>
-    </p:spTree>
-    <p:extLst>
-      <p:ext uri="{BB962C8B-B14F-4D97-AF65-F5344CB8AC3E}">
-        <p14:creationId xmlns:p14="http://schemas.microsoft.com/office/powerpoint/2010/main" xmlns="" val="2214369682"/>
-      </p:ext>
-    </p:extLst>
-  </p:cSld>
-  <p:clrMapOvr>
-    <a:masterClrMapping/>
-  </p:clrMapOvr>
-  <p:timing>
-    <p:tnLst>
-      <p:par>
-        <p:cTn id="1" dur="indefinite" restart="never" nodeType="tmRoot"/>
-      </p:par>
-    </p:tnLst>
-  </p:timing>
-</p:sld>
-</file>
-
-<file path=ppt/slides/slide12.xml><?xml version="1.0" encoding="utf-8"?>
-<p:sld xmlns:a="http://schemas.openxmlformats.org/drawingml/2006/main" xmlns:r="http://schemas.openxmlformats.org/officeDocument/2006/relationships" xmlns:p="http://schemas.openxmlformats.org/presentationml/2006/main">
-  <p:cSld>
-    <p:spTree>
-      <p:nvGrpSpPr>
-        <p:cNvPr id="1" name=""/>
-        <p:cNvGrpSpPr/>
-        <p:nvPr/>
-      </p:nvGrpSpPr>
-      <p:grpSpPr>
-        <a:xfrm>
-          <a:off x="0" y="0"/>
-          <a:ext cx="0" cy="0"/>
-          <a:chOff x="0" y="0"/>
-          <a:chExt cx="0" cy="0"/>
-        </a:xfrm>
-      </p:grpSpPr>
-      <p:sp>
-        <p:nvSpPr>
-          <p:cNvPr id="2" name="Titolo 1"/>
-          <p:cNvSpPr>
-            <a:spLocks noGrp="1"/>
-          </p:cNvSpPr>
-          <p:nvPr>
-            <p:ph type="title"/>
-          </p:nvPr>
-        </p:nvSpPr>
-        <p:spPr/>
-        <p:txBody>
-          <a:bodyPr/>
-          <a:lstStyle/>
-          <a:p>
-            <a:pPr algn="ctr"/>
-            <a:r>
-              <a:rPr lang="it-IT" dirty="0" err="1" smtClean="0"/>
-              <a:t>Mockup</a:t>
-            </a:r>
-            <a:r>
-              <a:rPr lang="it-IT" dirty="0" smtClean="0"/>
-              <a:t> - </a:t>
-            </a:r>
-            <a:r>
-              <a:rPr lang="it-IT" dirty="0" err="1" smtClean="0"/>
-              <a:t>Calendar</a:t>
-            </a:r>
-            <a:endParaRPr lang="it-IT" dirty="0"/>
-          </a:p>
-        </p:txBody>
-      </p:sp>
-      <p:sp>
-        <p:nvSpPr>
-          <p:cNvPr id="3" name="Segnaposto numero diapositiva 2"/>
-          <p:cNvSpPr>
-            <a:spLocks noGrp="1"/>
-          </p:cNvSpPr>
-          <p:nvPr>
-            <p:ph type="sldNum" sz="quarter" idx="12"/>
-          </p:nvPr>
-        </p:nvSpPr>
-        <p:spPr/>
-        <p:txBody>
-          <a:bodyPr/>
-          <a:lstStyle/>
-          <a:p>
-            <a:fld id="{244FB03B-CF6E-497D-BB5D-CBD3EA4BF293}" type="slidenum">
-              <a:rPr lang="it-IT" smtClean="0"/>
-              <a:pPr/>
-              <a:t>12</a:t>
             </a:fld>
             <a:endParaRPr lang="it-IT"/>
           </a:p>
@@ -8034,7 +7793,7 @@
           <a:blip r:embed="rId2" cstate="print">
             <a:extLst>
               <a:ext uri="{28A0092B-C50C-407E-A947-70E740481C1C}">
-                <a14:useLocalDpi xmlns:a14="http://schemas.microsoft.com/office/drawing/2010/main" xmlns="" val="0"/>
+                <a14:useLocalDpi xmlns:a14="http://schemas.microsoft.com/office/drawing/2010/main" val="0"/>
               </a:ext>
             </a:extLst>
           </a:blip>
@@ -8088,7 +7847,7 @@
           <a:blip r:embed="rId4" cstate="print">
             <a:extLst>
               <a:ext uri="{28A0092B-C50C-407E-A947-70E740481C1C}">
-                <a14:useLocalDpi xmlns:a14="http://schemas.microsoft.com/office/drawing/2010/main" xmlns="" val="0"/>
+                <a14:useLocalDpi xmlns:a14="http://schemas.microsoft.com/office/drawing/2010/main" val="0"/>
               </a:ext>
             </a:extLst>
           </a:blip>
@@ -8133,7 +7892,7 @@
     </p:spTree>
     <p:extLst>
       <p:ext uri="{BB962C8B-B14F-4D97-AF65-F5344CB8AC3E}">
-        <p14:creationId xmlns:p14="http://schemas.microsoft.com/office/powerpoint/2010/main" xmlns="" val="1909493082"/>
+        <p14:creationId xmlns:p14="http://schemas.microsoft.com/office/powerpoint/2010/main" val="1909493082"/>
       </p:ext>
     </p:extLst>
   </p:cSld>
@@ -8150,7 +7909,7 @@
 </p:sld>
 </file>
 
-<file path=ppt/slides/slide13.xml><?xml version="1.0" encoding="utf-8"?>
+<file path=ppt/slides/slide12.xml><?xml version="1.0" encoding="utf-8"?>
 <p:sld xmlns:a="http://schemas.openxmlformats.org/drawingml/2006/main" xmlns:r="http://schemas.openxmlformats.org/officeDocument/2006/relationships" xmlns:p="http://schemas.openxmlformats.org/presentationml/2006/main">
   <p:cSld>
     <p:spTree>
@@ -8217,7 +7976,7 @@
             <a:fld id="{244FB03B-CF6E-497D-BB5D-CBD3EA4BF293}" type="slidenum">
               <a:rPr lang="it-IT" smtClean="0"/>
               <a:pPr/>
-              <a:t>13</a:t>
+              <a:t>12</a:t>
             </a:fld>
             <a:endParaRPr lang="it-IT"/>
           </a:p>
@@ -8235,7 +7994,7 @@
           <a:blip r:embed="rId2" cstate="print">
             <a:extLst>
               <a:ext uri="{28A0092B-C50C-407E-A947-70E740481C1C}">
-                <a14:useLocalDpi xmlns:a14="http://schemas.microsoft.com/office/drawing/2010/main" xmlns="" val="0"/>
+                <a14:useLocalDpi xmlns:a14="http://schemas.microsoft.com/office/drawing/2010/main" val="0"/>
               </a:ext>
             </a:extLst>
           </a:blip>
@@ -8280,7 +8039,158 @@
     </p:spTree>
     <p:extLst>
       <p:ext uri="{BB962C8B-B14F-4D97-AF65-F5344CB8AC3E}">
-        <p14:creationId xmlns:p14="http://schemas.microsoft.com/office/powerpoint/2010/main" xmlns="" val="1768473630"/>
+        <p14:creationId xmlns:p14="http://schemas.microsoft.com/office/powerpoint/2010/main" val="1768473630"/>
+      </p:ext>
+    </p:extLst>
+  </p:cSld>
+  <p:clrMapOvr>
+    <a:masterClrMapping/>
+  </p:clrMapOvr>
+  <p:timing>
+    <p:tnLst>
+      <p:par>
+        <p:cTn id="1" dur="indefinite" restart="never" nodeType="tmRoot"/>
+      </p:par>
+    </p:tnLst>
+  </p:timing>
+</p:sld>
+</file>
+
+<file path=ppt/slides/slide13.xml><?xml version="1.0" encoding="utf-8"?>
+<p:sld xmlns:a="http://schemas.openxmlformats.org/drawingml/2006/main" xmlns:r="http://schemas.openxmlformats.org/officeDocument/2006/relationships" xmlns:p="http://schemas.openxmlformats.org/presentationml/2006/main">
+  <p:cSld>
+    <p:spTree>
+      <p:nvGrpSpPr>
+        <p:cNvPr id="1" name=""/>
+        <p:cNvGrpSpPr/>
+        <p:nvPr/>
+      </p:nvGrpSpPr>
+      <p:grpSpPr>
+        <a:xfrm>
+          <a:off x="0" y="0"/>
+          <a:ext cx="0" cy="0"/>
+          <a:chOff x="0" y="0"/>
+          <a:chExt cx="0" cy="0"/>
+        </a:xfrm>
+      </p:grpSpPr>
+      <p:pic>
+        <p:nvPicPr>
+          <p:cNvPr id="5" name="Segnaposto contenuto 4"/>
+          <p:cNvPicPr>
+            <a:picLocks noGrp="1" noChangeAspect="1"/>
+          </p:cNvPicPr>
+          <p:nvPr>
+            <p:ph sz="half" idx="1"/>
+          </p:nvPr>
+        </p:nvPicPr>
+        <p:blipFill>
+          <a:blip r:embed="rId2" cstate="print">
+            <a:extLst>
+              <a:ext uri="{28A0092B-C50C-407E-A947-70E740481C1C}">
+                <a14:useLocalDpi xmlns:a14="http://schemas.microsoft.com/office/drawing/2010/main" val="0"/>
+              </a:ext>
+            </a:extLst>
+          </a:blip>
+          <a:stretch>
+            <a:fillRect/>
+          </a:stretch>
+        </p:blipFill>
+        <p:spPr>
+          <a:xfrm>
+            <a:off x="1382765" y="1575600"/>
+            <a:ext cx="4162281" cy="4022725"/>
+          </a:xfrm>
+        </p:spPr>
+      </p:pic>
+      <p:pic>
+        <p:nvPicPr>
+          <p:cNvPr id="8" name="Segnaposto contenuto 7"/>
+          <p:cNvPicPr>
+            <a:picLocks noGrp="1" noChangeAspect="1"/>
+          </p:cNvPicPr>
+          <p:nvPr>
+            <p:ph sz="half" idx="2"/>
+          </p:nvPr>
+        </p:nvPicPr>
+        <p:blipFill>
+          <a:blip r:embed="rId3" cstate="print">
+            <a:extLst>
+              <a:ext uri="{28A0092B-C50C-407E-A947-70E740481C1C}">
+                <a14:useLocalDpi xmlns:a14="http://schemas.microsoft.com/office/drawing/2010/main" val="0"/>
+              </a:ext>
+            </a:extLst>
+          </a:blip>
+          <a:stretch>
+            <a:fillRect/>
+          </a:stretch>
+        </p:blipFill>
+        <p:spPr>
+          <a:xfrm>
+            <a:off x="6503933" y="1092440"/>
+            <a:ext cx="4350105" cy="5181743"/>
+          </a:xfrm>
+        </p:spPr>
+      </p:pic>
+      <p:sp>
+        <p:nvSpPr>
+          <p:cNvPr id="10" name="Segnaposto numero diapositiva 9"/>
+          <p:cNvSpPr>
+            <a:spLocks noGrp="1"/>
+          </p:cNvSpPr>
+          <p:nvPr>
+            <p:ph type="sldNum" sz="quarter" idx="12"/>
+          </p:nvPr>
+        </p:nvSpPr>
+        <p:spPr/>
+        <p:txBody>
+          <a:bodyPr/>
+          <a:lstStyle/>
+          <a:p>
+            <a:fld id="{244FB03B-CF6E-497D-BB5D-CBD3EA4BF293}" type="slidenum">
+              <a:rPr lang="it-IT" smtClean="0"/>
+              <a:pPr/>
+              <a:t>13</a:t>
+            </a:fld>
+            <a:endParaRPr lang="it-IT"/>
+          </a:p>
+        </p:txBody>
+      </p:sp>
+      <p:sp>
+        <p:nvSpPr>
+          <p:cNvPr id="3" name="Titolo 2"/>
+          <p:cNvSpPr>
+            <a:spLocks noGrp="1"/>
+          </p:cNvSpPr>
+          <p:nvPr>
+            <p:ph type="title"/>
+          </p:nvPr>
+        </p:nvSpPr>
+        <p:spPr/>
+        <p:txBody>
+          <a:bodyPr/>
+          <a:lstStyle/>
+          <a:p>
+            <a:pPr algn="ctr"/>
+            <a:r>
+              <a:rPr lang="it-IT" dirty="0" err="1"/>
+              <a:t>Manage</a:t>
+            </a:r>
+            <a:r>
+              <a:rPr lang="it-IT" dirty="0"/>
+              <a:t> Meeting </a:t>
+            </a:r>
+            <a:r>
+              <a:rPr lang="it-IT" dirty="0" err="1"/>
+              <a:t>Participation</a:t>
+            </a:r>
+            <a:endParaRPr lang="it-IT" dirty="0"/>
+          </a:p>
+        </p:txBody>
+      </p:sp>
+    </p:spTree>
+    <p:extLst>
+      <p:ext uri="{BB962C8B-B14F-4D97-AF65-F5344CB8AC3E}">
+        <p14:creationId xmlns:p14="http://schemas.microsoft.com/office/powerpoint/2010/main" val="3057634835"/>
       </p:ext>
     </p:extLst>
   </p:cSld>
@@ -8323,15 +8233,21 @@
           <p:nvPr/>
         </p:nvPicPr>
         <p:blipFill>
-          <a:blip r:embed="rId3" cstate="print"/>
+          <a:blip r:embed="rId2" cstate="print">
+            <a:extLst>
+              <a:ext uri="{28A0092B-C50C-407E-A947-70E740481C1C}">
+                <a14:useLocalDpi xmlns:a14="http://schemas.microsoft.com/office/drawing/2010/main" val="0"/>
+              </a:ext>
+            </a:extLst>
+          </a:blip>
           <a:stretch>
             <a:fillRect/>
           </a:stretch>
         </p:blipFill>
         <p:spPr>
-          <a:xfrm>
-            <a:off x="3767489" y="0"/>
-            <a:ext cx="4657023" cy="6858000"/>
+          <a:xfrm rot="16200000">
+            <a:off x="3921994" y="-699119"/>
+            <a:ext cx="5051490" cy="8805468"/>
           </a:xfrm>
           <a:prstGeom prst="rect">
             <a:avLst/>
@@ -8340,7 +8256,7 @@
       </p:pic>
       <p:sp>
         <p:nvSpPr>
-          <p:cNvPr id="7" name="Segnaposto numero diapositiva 6"/>
+          <p:cNvPr id="8" name="Segnaposto numero diapositiva 7"/>
           <p:cNvSpPr>
             <a:spLocks noGrp="1"/>
           </p:cNvSpPr>
@@ -8362,10 +8278,42 @@
           </a:p>
         </p:txBody>
       </p:sp>
+      <p:sp>
+        <p:nvSpPr>
+          <p:cNvPr id="2" name="Titolo 1"/>
+          <p:cNvSpPr>
+            <a:spLocks noGrp="1"/>
+          </p:cNvSpPr>
+          <p:nvPr>
+            <p:ph type="title"/>
+          </p:nvPr>
+        </p:nvSpPr>
+        <p:spPr/>
+        <p:txBody>
+          <a:bodyPr/>
+          <a:lstStyle/>
+          <a:p>
+            <a:pPr algn="ctr"/>
+            <a:r>
+              <a:rPr lang="it-IT" dirty="0" err="1"/>
+              <a:t>Class</a:t>
+            </a:r>
+            <a:r>
+              <a:rPr lang="it-IT" dirty="0"/>
+              <a:t> </a:t>
+            </a:r>
+            <a:r>
+              <a:rPr lang="it-IT" dirty="0" err="1"/>
+              <a:t>Diagram</a:t>
+            </a:r>
+            <a:endParaRPr lang="it-IT" dirty="0"/>
+          </a:p>
+        </p:txBody>
+      </p:sp>
     </p:spTree>
     <p:extLst>
       <p:ext uri="{BB962C8B-B14F-4D97-AF65-F5344CB8AC3E}">
-        <p14:creationId xmlns:p14="http://schemas.microsoft.com/office/powerpoint/2010/main" xmlns="" val="3088683998"/>
+        <p14:creationId xmlns:p14="http://schemas.microsoft.com/office/powerpoint/2010/main" val="4275793664"/>
       </p:ext>
     </p:extLst>
   </p:cSld>
@@ -8399,280 +8347,6 @@
           <a:chExt cx="0" cy="0"/>
         </a:xfrm>
       </p:grpSpPr>
-      <p:pic>
-        <p:nvPicPr>
-          <p:cNvPr id="5" name="Segnaposto contenuto 4"/>
-          <p:cNvPicPr>
-            <a:picLocks noGrp="1" noChangeAspect="1"/>
-          </p:cNvPicPr>
-          <p:nvPr>
-            <p:ph sz="half" idx="1"/>
-          </p:nvPr>
-        </p:nvPicPr>
-        <p:blipFill>
-          <a:blip r:embed="rId2" cstate="print">
-            <a:extLst>
-              <a:ext uri="{28A0092B-C50C-407E-A947-70E740481C1C}">
-                <a14:useLocalDpi xmlns:a14="http://schemas.microsoft.com/office/drawing/2010/main" xmlns="" val="0"/>
-              </a:ext>
-            </a:extLst>
-          </a:blip>
-          <a:stretch>
-            <a:fillRect/>
-          </a:stretch>
-        </p:blipFill>
-        <p:spPr>
-          <a:xfrm>
-            <a:off x="1382765" y="1575600"/>
-            <a:ext cx="4162281" cy="4022725"/>
-          </a:xfrm>
-        </p:spPr>
-      </p:pic>
-      <p:pic>
-        <p:nvPicPr>
-          <p:cNvPr id="8" name="Segnaposto contenuto 7"/>
-          <p:cNvPicPr>
-            <a:picLocks noGrp="1" noChangeAspect="1"/>
-          </p:cNvPicPr>
-          <p:nvPr>
-            <p:ph sz="half" idx="2"/>
-          </p:nvPr>
-        </p:nvPicPr>
-        <p:blipFill>
-          <a:blip r:embed="rId3" cstate="print">
-            <a:extLst>
-              <a:ext uri="{28A0092B-C50C-407E-A947-70E740481C1C}">
-                <a14:useLocalDpi xmlns:a14="http://schemas.microsoft.com/office/drawing/2010/main" xmlns="" val="0"/>
-              </a:ext>
-            </a:extLst>
-          </a:blip>
-          <a:stretch>
-            <a:fillRect/>
-          </a:stretch>
-        </p:blipFill>
-        <p:spPr>
-          <a:xfrm>
-            <a:off x="6503933" y="1092440"/>
-            <a:ext cx="4350105" cy="5181743"/>
-          </a:xfrm>
-        </p:spPr>
-      </p:pic>
-      <p:sp>
-        <p:nvSpPr>
-          <p:cNvPr id="10" name="Segnaposto numero diapositiva 9"/>
-          <p:cNvSpPr>
-            <a:spLocks noGrp="1"/>
-          </p:cNvSpPr>
-          <p:nvPr>
-            <p:ph type="sldNum" sz="quarter" idx="12"/>
-          </p:nvPr>
-        </p:nvSpPr>
-        <p:spPr/>
-        <p:txBody>
-          <a:bodyPr/>
-          <a:lstStyle/>
-          <a:p>
-            <a:fld id="{244FB03B-CF6E-497D-BB5D-CBD3EA4BF293}" type="slidenum">
-              <a:rPr lang="it-IT" smtClean="0"/>
-              <a:pPr/>
-              <a:t>15</a:t>
-            </a:fld>
-            <a:endParaRPr lang="it-IT"/>
-          </a:p>
-        </p:txBody>
-      </p:sp>
-      <p:sp>
-        <p:nvSpPr>
-          <p:cNvPr id="3" name="Titolo 2"/>
-          <p:cNvSpPr>
-            <a:spLocks noGrp="1"/>
-          </p:cNvSpPr>
-          <p:nvPr>
-            <p:ph type="title"/>
-          </p:nvPr>
-        </p:nvSpPr>
-        <p:spPr/>
-        <p:txBody>
-          <a:bodyPr/>
-          <a:lstStyle/>
-          <a:p>
-            <a:pPr algn="ctr"/>
-            <a:r>
-              <a:rPr lang="it-IT" dirty="0" err="1"/>
-              <a:t>Manage</a:t>
-            </a:r>
-            <a:r>
-              <a:rPr lang="it-IT" dirty="0"/>
-              <a:t> Meeting </a:t>
-            </a:r>
-            <a:r>
-              <a:rPr lang="it-IT" dirty="0" err="1"/>
-              <a:t>Participation</a:t>
-            </a:r>
-            <a:endParaRPr lang="it-IT" dirty="0"/>
-          </a:p>
-        </p:txBody>
-      </p:sp>
-    </p:spTree>
-    <p:extLst>
-      <p:ext uri="{BB962C8B-B14F-4D97-AF65-F5344CB8AC3E}">
-        <p14:creationId xmlns:p14="http://schemas.microsoft.com/office/powerpoint/2010/main" xmlns="" val="3057634835"/>
-      </p:ext>
-    </p:extLst>
-  </p:cSld>
-  <p:clrMapOvr>
-    <a:masterClrMapping/>
-  </p:clrMapOvr>
-  <p:timing>
-    <p:tnLst>
-      <p:par>
-        <p:cTn id="1" dur="indefinite" restart="never" nodeType="tmRoot"/>
-      </p:par>
-    </p:tnLst>
-  </p:timing>
-</p:sld>
-</file>
-
-<file path=ppt/slides/slide16.xml><?xml version="1.0" encoding="utf-8"?>
-<p:sld xmlns:a="http://schemas.openxmlformats.org/drawingml/2006/main" xmlns:r="http://schemas.openxmlformats.org/officeDocument/2006/relationships" xmlns:p="http://schemas.openxmlformats.org/presentationml/2006/main">
-  <p:cSld>
-    <p:spTree>
-      <p:nvGrpSpPr>
-        <p:cNvPr id="1" name=""/>
-        <p:cNvGrpSpPr/>
-        <p:nvPr/>
-      </p:nvGrpSpPr>
-      <p:grpSpPr>
-        <a:xfrm>
-          <a:off x="0" y="0"/>
-          <a:ext cx="0" cy="0"/>
-          <a:chOff x="0" y="0"/>
-          <a:chExt cx="0" cy="0"/>
-        </a:xfrm>
-      </p:grpSpPr>
-      <p:pic>
-        <p:nvPicPr>
-          <p:cNvPr id="5" name="Immagine 4"/>
-          <p:cNvPicPr>
-            <a:picLocks noChangeAspect="1"/>
-          </p:cNvPicPr>
-          <p:nvPr/>
-        </p:nvPicPr>
-        <p:blipFill>
-          <a:blip r:embed="rId2" cstate="print">
-            <a:extLst>
-              <a:ext uri="{28A0092B-C50C-407E-A947-70E740481C1C}">
-                <a14:useLocalDpi xmlns:a14="http://schemas.microsoft.com/office/drawing/2010/main" xmlns="" val="0"/>
-              </a:ext>
-            </a:extLst>
-          </a:blip>
-          <a:stretch>
-            <a:fillRect/>
-          </a:stretch>
-        </p:blipFill>
-        <p:spPr>
-          <a:xfrm rot="16200000">
-            <a:off x="3921994" y="-699119"/>
-            <a:ext cx="5051490" cy="8805468"/>
-          </a:xfrm>
-          <a:prstGeom prst="rect">
-            <a:avLst/>
-          </a:prstGeom>
-        </p:spPr>
-      </p:pic>
-      <p:sp>
-        <p:nvSpPr>
-          <p:cNvPr id="8" name="Segnaposto numero diapositiva 7"/>
-          <p:cNvSpPr>
-            <a:spLocks noGrp="1"/>
-          </p:cNvSpPr>
-          <p:nvPr>
-            <p:ph type="sldNum" sz="quarter" idx="12"/>
-          </p:nvPr>
-        </p:nvSpPr>
-        <p:spPr/>
-        <p:txBody>
-          <a:bodyPr/>
-          <a:lstStyle/>
-          <a:p>
-            <a:fld id="{244FB03B-CF6E-497D-BB5D-CBD3EA4BF293}" type="slidenum">
-              <a:rPr lang="it-IT" smtClean="0"/>
-              <a:pPr/>
-              <a:t>16</a:t>
-            </a:fld>
-            <a:endParaRPr lang="it-IT"/>
-          </a:p>
-        </p:txBody>
-      </p:sp>
-      <p:sp>
-        <p:nvSpPr>
-          <p:cNvPr id="2" name="Titolo 1"/>
-          <p:cNvSpPr>
-            <a:spLocks noGrp="1"/>
-          </p:cNvSpPr>
-          <p:nvPr>
-            <p:ph type="title"/>
-          </p:nvPr>
-        </p:nvSpPr>
-        <p:spPr/>
-        <p:txBody>
-          <a:bodyPr/>
-          <a:lstStyle/>
-          <a:p>
-            <a:pPr algn="ctr"/>
-            <a:r>
-              <a:rPr lang="it-IT" dirty="0" err="1"/>
-              <a:t>Class</a:t>
-            </a:r>
-            <a:r>
-              <a:rPr lang="it-IT" dirty="0"/>
-              <a:t> </a:t>
-            </a:r>
-            <a:r>
-              <a:rPr lang="it-IT" dirty="0" err="1"/>
-              <a:t>Diagram</a:t>
-            </a:r>
-            <a:endParaRPr lang="it-IT" dirty="0"/>
-          </a:p>
-        </p:txBody>
-      </p:sp>
-    </p:spTree>
-    <p:extLst>
-      <p:ext uri="{BB962C8B-B14F-4D97-AF65-F5344CB8AC3E}">
-        <p14:creationId xmlns:p14="http://schemas.microsoft.com/office/powerpoint/2010/main" xmlns="" val="4275793664"/>
-      </p:ext>
-    </p:extLst>
-  </p:cSld>
-  <p:clrMapOvr>
-    <a:masterClrMapping/>
-  </p:clrMapOvr>
-  <p:timing>
-    <p:tnLst>
-      <p:par>
-        <p:cTn id="1" dur="indefinite" restart="never" nodeType="tmRoot"/>
-      </p:par>
-    </p:tnLst>
-  </p:timing>
-</p:sld>
-</file>
-
-<file path=ppt/slides/slide17.xml><?xml version="1.0" encoding="utf-8"?>
-<p:sld xmlns:a="http://schemas.openxmlformats.org/drawingml/2006/main" xmlns:r="http://schemas.openxmlformats.org/officeDocument/2006/relationships" xmlns:p="http://schemas.openxmlformats.org/presentationml/2006/main">
-  <p:cSld>
-    <p:spTree>
-      <p:nvGrpSpPr>
-        <p:cNvPr id="1" name=""/>
-        <p:cNvGrpSpPr/>
-        <p:nvPr/>
-      </p:nvGrpSpPr>
-      <p:grpSpPr>
-        <a:xfrm>
-          <a:off x="0" y="0"/>
-          <a:ext cx="0" cy="0"/>
-          <a:chOff x="0" y="0"/>
-          <a:chExt cx="0" cy="0"/>
-        </a:xfrm>
-      </p:grpSpPr>
       <p:sp>
         <p:nvSpPr>
           <p:cNvPr id="2" name="Titolo 1"/>
@@ -8717,7 +8391,7 @@
           <a:blip r:embed="rId2" cstate="print">
             <a:extLst>
               <a:ext uri="{28A0092B-C50C-407E-A947-70E740481C1C}">
-                <a14:useLocalDpi xmlns:a14="http://schemas.microsoft.com/office/drawing/2010/main" xmlns="" val="0"/>
+                <a14:useLocalDpi xmlns:a14="http://schemas.microsoft.com/office/drawing/2010/main" val="0"/>
               </a:ext>
             </a:extLst>
           </a:blip>
@@ -8753,7 +8427,7 @@
             <a:fld id="{244FB03B-CF6E-497D-BB5D-CBD3EA4BF293}" type="slidenum">
               <a:rPr lang="it-IT" smtClean="0"/>
               <a:pPr/>
-              <a:t>17</a:t>
+              <a:t>15</a:t>
             </a:fld>
             <a:endParaRPr lang="it-IT"/>
           </a:p>
@@ -8762,7 +8436,7 @@
     </p:spTree>
     <p:extLst>
       <p:ext uri="{BB962C8B-B14F-4D97-AF65-F5344CB8AC3E}">
-        <p14:creationId xmlns:p14="http://schemas.microsoft.com/office/powerpoint/2010/main" xmlns="" val="2109112127"/>
+        <p14:creationId xmlns:p14="http://schemas.microsoft.com/office/powerpoint/2010/main" val="2109112127"/>
       </p:ext>
     </p:extLst>
   </p:cSld>
@@ -8808,8 +8482,8 @@
         </p:nvSpPr>
         <p:spPr>
           <a:xfrm>
-            <a:off x="1097280" y="1296000"/>
-            <a:ext cx="4937760" cy="504000"/>
+            <a:off x="1097280" y="1332000"/>
+            <a:ext cx="4937760" cy="576000"/>
           </a:xfrm>
         </p:spPr>
         <p:txBody>
@@ -8818,10 +8492,10 @@
           <a:p>
             <a:pPr algn="ctr"/>
             <a:r>
-              <a:rPr lang="it-IT" dirty="0" smtClean="0"/>
+              <a:rPr lang="it-IT" sz="3200" dirty="0" err="1" smtClean="0"/>
               <a:t>Travel</a:t>
             </a:r>
-            <a:endParaRPr lang="it-IT" dirty="0"/>
+            <a:endParaRPr lang="it-IT" sz="3200" dirty="0"/>
           </a:p>
         </p:txBody>
       </p:sp>
@@ -8837,8 +8511,8 @@
         </p:nvSpPr>
         <p:spPr>
           <a:xfrm>
-            <a:off x="1097280" y="2032000"/>
-            <a:ext cx="4937760" cy="4185920"/>
+            <a:off x="1038578" y="2269067"/>
+            <a:ext cx="4996462" cy="3600000"/>
           </a:xfrm>
         </p:spPr>
         <p:txBody>
@@ -8848,70 +8522,48 @@
           <a:lstStyle/>
           <a:p>
             <a:r>
-              <a:rPr lang="en-US" dirty="0" smtClean="0"/>
-              <a:t>Travel meeting-meeting or default location-meeting </a:t>
-            </a:r>
-          </a:p>
-          <a:p>
-            <a:r>
-              <a:rPr lang="en-US" dirty="0" smtClean="0"/>
-              <a:t>Biking (owned/shared), Driving (owned/shared), Walking, Public Transportation</a:t>
-            </a:r>
-          </a:p>
-          <a:p>
-            <a:r>
-              <a:rPr lang="en-US" dirty="0" smtClean="0"/>
-              <a:t>Preference list of travel means ordered by user’s preferences</a:t>
-            </a:r>
-          </a:p>
-          <a:p>
-            <a:r>
-              <a:rPr lang="en-US" dirty="0" smtClean="0"/>
-              <a:t>Restrictions </a:t>
-            </a:r>
-            <a:r>
-              <a:rPr lang="en-US" dirty="0"/>
-              <a:t>and/or inhibitions on </a:t>
-            </a:r>
-            <a:r>
-              <a:rPr lang="en-US" dirty="0" smtClean="0"/>
-              <a:t>the use of some travel means through constraints</a:t>
-            </a:r>
-          </a:p>
-          <a:p>
-            <a:r>
-              <a:rPr lang="en-US" dirty="0" smtClean="0"/>
-              <a:t>The </a:t>
-            </a:r>
-            <a:r>
-              <a:rPr lang="en-GB" dirty="0" smtClean="0"/>
-              <a:t>system </a:t>
-            </a:r>
-            <a:r>
-              <a:rPr lang="en-GB" dirty="0"/>
-              <a:t>will </a:t>
-            </a:r>
-            <a:r>
-              <a:rPr lang="en-GB" dirty="0" smtClean="0"/>
-              <a:t>give </a:t>
-            </a:r>
-            <a:r>
-              <a:rPr lang="en-GB" dirty="0"/>
-              <a:t>real time indications to the user about the first path in the </a:t>
-            </a:r>
-            <a:r>
-              <a:rPr lang="en-GB" dirty="0" smtClean="0"/>
-              <a:t>weighted preference </a:t>
-            </a:r>
-            <a:r>
-              <a:rPr lang="en-GB" dirty="0"/>
-              <a:t>list, according to constraints imposed</a:t>
-            </a:r>
-            <a:r>
-              <a:rPr lang="en-GB" dirty="0" smtClean="0"/>
-              <a:t>.</a:t>
-            </a:r>
-            <a:endParaRPr lang="en-US" dirty="0" smtClean="0"/>
+              <a:rPr lang="en-US" sz="2400" dirty="0" smtClean="0"/>
+              <a:t> Meeting-meeting or </a:t>
+            </a:r>
+            <a:br>
+              <a:rPr lang="en-US" sz="2400" dirty="0" smtClean="0"/>
+            </a:br>
+            <a:r>
+              <a:rPr lang="en-US" sz="2400" dirty="0" smtClean="0"/>
+              <a:t> default location-meeting </a:t>
+            </a:r>
+          </a:p>
+          <a:p>
+            <a:r>
+              <a:rPr lang="en-US" sz="2400" dirty="0" smtClean="0"/>
+              <a:t> Biking,  Driving,  Walking, </a:t>
+            </a:r>
+            <a:br>
+              <a:rPr lang="en-US" sz="2400" dirty="0" smtClean="0"/>
+            </a:br>
+            <a:r>
+              <a:rPr lang="en-US" sz="2400" dirty="0" smtClean="0"/>
+              <a:t> Public Transportation</a:t>
+            </a:r>
+          </a:p>
+          <a:p>
+            <a:r>
+              <a:rPr lang="en-US" sz="2400" dirty="0" smtClean="0"/>
+              <a:t> Preference list</a:t>
+            </a:r>
+          </a:p>
+          <a:p>
+            <a:r>
+              <a:rPr lang="en-US" sz="2400" dirty="0" smtClean="0"/>
+              <a:t> Constraint</a:t>
+            </a:r>
+          </a:p>
+          <a:p>
+            <a:r>
+              <a:rPr lang="en-GB" sz="2400" dirty="0" smtClean="0"/>
+              <a:t> Real-time indications</a:t>
+            </a:r>
+            <a:endParaRPr lang="en-US" sz="2400" dirty="0" smtClean="0"/>
           </a:p>
         </p:txBody>
       </p:sp>
@@ -8927,20 +8579,22 @@
         </p:nvSpPr>
         <p:spPr>
           <a:xfrm>
-            <a:off x="6217920" y="1296000"/>
-            <a:ext cx="4937760" cy="504000"/>
+            <a:off x="6217920" y="1332000"/>
+            <a:ext cx="4937760" cy="576000"/>
           </a:xfrm>
         </p:spPr>
         <p:txBody>
-          <a:bodyPr/>
+          <a:bodyPr>
+            <a:normAutofit/>
+          </a:bodyPr>
           <a:lstStyle/>
           <a:p>
             <a:pPr algn="ctr"/>
             <a:r>
-              <a:rPr lang="it-IT" dirty="0" smtClean="0"/>
+              <a:rPr lang="it-IT" sz="3200" dirty="0" smtClean="0"/>
               <a:t>Meeting</a:t>
             </a:r>
-            <a:endParaRPr lang="it-IT" dirty="0"/>
+            <a:endParaRPr lang="it-IT" sz="3200" dirty="0"/>
           </a:p>
         </p:txBody>
       </p:sp>
@@ -8956,83 +8610,100 @@
         </p:nvSpPr>
         <p:spPr>
           <a:xfrm>
-            <a:off x="6217920" y="2030400"/>
-            <a:ext cx="4937760" cy="4369329"/>
+            <a:off x="6217920" y="2268000"/>
+            <a:ext cx="4937760" cy="3600000"/>
           </a:xfrm>
         </p:spPr>
         <p:txBody>
-          <a:bodyPr anchor="t"/>
-          <a:lstStyle/>
-          <a:p>
-            <a:r>
-              <a:rPr lang="en-GB" dirty="0" smtClean="0"/>
-              <a:t>Event </a:t>
-            </a:r>
-            <a:r>
-              <a:rPr lang="en-GB" dirty="0"/>
-              <a:t>organized by a user with a title, a date and a </a:t>
-            </a:r>
-            <a:r>
-              <a:rPr lang="en-GB" dirty="0" smtClean="0"/>
-              <a:t>location. The user who creates it becomes the first administrator</a:t>
-            </a:r>
-          </a:p>
-          <a:p>
-            <a:r>
-              <a:rPr lang="en-GB" dirty="0" smtClean="0"/>
-              <a:t>Users who </a:t>
-            </a:r>
-            <a:r>
-              <a:rPr lang="en-GB" dirty="0"/>
-              <a:t>are invited to a meeting can accept, decline or reschedule </a:t>
-            </a:r>
-            <a:r>
-              <a:rPr lang="en-GB" dirty="0" smtClean="0"/>
+          <a:bodyPr anchor="t">
+            <a:noAutofit/>
+          </a:bodyPr>
+          <a:lstStyle/>
+          <a:p>
+            <a:r>
+              <a:rPr lang="en-GB" sz="2400" dirty="0" smtClean="0"/>
+              <a:t> </a:t>
+            </a:r>
+            <a:r>
+              <a:rPr lang="en-GB" sz="2400" dirty="0"/>
+              <a:t>T</a:t>
+            </a:r>
+            <a:r>
+              <a:rPr lang="en-GB" sz="2400" dirty="0" smtClean="0"/>
+              <a:t>itle</a:t>
+            </a:r>
+            <a:r>
+              <a:rPr lang="en-GB" sz="2400" dirty="0"/>
+              <a:t>, </a:t>
+            </a:r>
+            <a:r>
+              <a:rPr lang="en-GB" sz="2400" dirty="0" smtClean="0"/>
+              <a:t>date </a:t>
+            </a:r>
+            <a:r>
+              <a:rPr lang="en-GB" sz="2400" dirty="0" smtClean="0"/>
+              <a:t>and </a:t>
+            </a:r>
+            <a:r>
+              <a:rPr lang="en-GB" sz="2400" dirty="0" smtClean="0"/>
+              <a:t>location</a:t>
+            </a:r>
+            <a:endParaRPr lang="en-GB" sz="2400" dirty="0" smtClean="0"/>
+          </a:p>
+          <a:p>
+            <a:r>
+              <a:rPr lang="en-GB" sz="2400" dirty="0" smtClean="0"/>
+              <a:t> Administrators</a:t>
+            </a:r>
+          </a:p>
+          <a:p>
+            <a:r>
+              <a:rPr lang="en-GB" sz="2400" dirty="0" smtClean="0"/>
+              <a:t> Accept, </a:t>
+            </a:r>
+            <a:r>
+              <a:rPr lang="en-GB" sz="2400" dirty="0"/>
+              <a:t>decline or reschedule </a:t>
+            </a:r>
+            <a:r>
+              <a:rPr lang="en-GB" sz="2400" dirty="0" smtClean="0"/>
               <a:t>the </a:t>
             </a:r>
             <a:r>
-              <a:rPr lang="en-US" dirty="0" smtClean="0"/>
+              <a:rPr lang="en-US" sz="2400" dirty="0" smtClean="0"/>
               <a:t>invitation</a:t>
             </a:r>
           </a:p>
           <a:p>
             <a:r>
-              <a:rPr lang="en-US" dirty="0" smtClean="0"/>
-              <a:t>Chat, </a:t>
-            </a:r>
-            <a:r>
-              <a:rPr lang="en-GB" dirty="0" smtClean="0"/>
+              <a:rPr lang="en-US" sz="2400" dirty="0" smtClean="0"/>
+              <a:t> Chat, </a:t>
+            </a:r>
+            <a:r>
+              <a:rPr lang="en-GB" sz="2400" dirty="0" smtClean="0"/>
               <a:t>upload </a:t>
             </a:r>
             <a:r>
-              <a:rPr lang="en-GB" dirty="0"/>
-              <a:t>files and add personal or public </a:t>
-            </a:r>
-            <a:r>
-              <a:rPr lang="en-GB" dirty="0" smtClean="0"/>
+              <a:rPr lang="en-GB" sz="2400" dirty="0"/>
+              <a:t>files and </a:t>
+            </a:r>
+            <a:r>
+              <a:rPr lang="en-GB" sz="2400" dirty="0" smtClean="0"/>
               <a:t>notes</a:t>
             </a:r>
           </a:p>
           <a:p>
             <a:r>
-              <a:rPr lang="en-GB" dirty="0" smtClean="0"/>
-              <a:t>Categories and subcategories</a:t>
-            </a:r>
-          </a:p>
-          <a:p>
-            <a:r>
-              <a:rPr lang="en-GB" dirty="0"/>
-              <a:t>Instant </a:t>
-            </a:r>
-            <a:r>
-              <a:rPr lang="en-GB" dirty="0" smtClean="0"/>
-              <a:t>Meeting: a </a:t>
-            </a:r>
-            <a:r>
-              <a:rPr lang="en-GB" dirty="0"/>
-              <a:t>meeting with only one participant and that does not last in time</a:t>
-            </a:r>
-            <a:endParaRPr lang="it-IT" dirty="0"/>
+              <a:rPr lang="en-GB" sz="2400" dirty="0" smtClean="0"/>
+              <a:t> Categories and subcategories</a:t>
+            </a:r>
+          </a:p>
+          <a:p>
+            <a:r>
+              <a:rPr lang="en-GB" sz="2400" dirty="0" smtClean="0"/>
+              <a:t> Instant Meetings</a:t>
+            </a:r>
+            <a:endParaRPr lang="it-IT" sz="2400" dirty="0"/>
           </a:p>
         </p:txBody>
       </p:sp>
@@ -9095,7 +8766,7 @@
     </p:spTree>
     <p:extLst>
       <p:ext uri="{BB962C8B-B14F-4D97-AF65-F5344CB8AC3E}">
-        <p14:creationId xmlns:p14="http://schemas.microsoft.com/office/powerpoint/2010/main" xmlns="" val="3700084062"/>
+        <p14:creationId xmlns:p14="http://schemas.microsoft.com/office/powerpoint/2010/main" val="3700084062"/>
       </p:ext>
     </p:extLst>
   </p:cSld>
@@ -9131,271 +8802,214 @@
       </p:grpSpPr>
       <p:sp>
         <p:nvSpPr>
-          <p:cNvPr id="4" name="Segnaposto testo 3"/>
-          <p:cNvSpPr>
-            <a:spLocks noGrp="1"/>
-          </p:cNvSpPr>
-          <p:nvPr>
-            <p:ph type="body" idx="1"/>
+          <p:cNvPr id="7" name="Titolo 6"/>
+          <p:cNvSpPr>
+            <a:spLocks noGrp="1"/>
+          </p:cNvSpPr>
+          <p:nvPr>
+            <p:ph type="title"/>
+          </p:nvPr>
+        </p:nvSpPr>
+        <p:spPr/>
+        <p:txBody>
+          <a:bodyPr/>
+          <a:lstStyle/>
+          <a:p>
+            <a:pPr algn="ctr"/>
+            <a:r>
+              <a:rPr lang="it-IT" dirty="0" smtClean="0"/>
+              <a:t>User </a:t>
+            </a:r>
+            <a:r>
+              <a:rPr lang="it-IT" dirty="0" err="1" smtClean="0"/>
+              <a:t>Characteristics</a:t>
+            </a:r>
+            <a:endParaRPr lang="it-IT" dirty="0"/>
+          </a:p>
+        </p:txBody>
+      </p:sp>
+      <p:sp>
+        <p:nvSpPr>
+          <p:cNvPr id="8" name="Segnaposto contenuto 7"/>
+          <p:cNvSpPr>
+            <a:spLocks noGrp="1"/>
+          </p:cNvSpPr>
+          <p:nvPr>
+            <p:ph idx="1"/>
           </p:nvPr>
         </p:nvSpPr>
         <p:spPr>
           <a:xfrm>
-            <a:off x="1097280" y="1332000"/>
-            <a:ext cx="4937760" cy="576000"/>
+            <a:off x="1097279" y="1478844"/>
+            <a:ext cx="10090009" cy="4064000"/>
           </a:xfrm>
         </p:spPr>
         <p:txBody>
-          <a:bodyPr/>
-          <a:lstStyle/>
-          <a:p>
-            <a:pPr algn="ctr"/>
-            <a:r>
-              <a:rPr lang="it-IT" sz="3200" dirty="0" err="1" smtClean="0"/>
-              <a:t>Travel</a:t>
-            </a:r>
-            <a:endParaRPr lang="it-IT" sz="3200" dirty="0"/>
-          </a:p>
-        </p:txBody>
-      </p:sp>
-      <p:sp>
-        <p:nvSpPr>
-          <p:cNvPr id="5" name="Segnaposto contenuto 4"/>
-          <p:cNvSpPr>
-            <a:spLocks noGrp="1"/>
-          </p:cNvSpPr>
-          <p:nvPr>
-            <p:ph sz="half" idx="2"/>
-          </p:nvPr>
-        </p:nvSpPr>
-        <p:spPr>
-          <a:xfrm>
-            <a:off x="1038578" y="2269067"/>
-            <a:ext cx="4996462" cy="3600000"/>
-          </a:xfrm>
-        </p:spPr>
-        <p:txBody>
-          <a:bodyPr anchor="t">
+          <a:bodyPr numCol="2" anchor="ctr">
             <a:normAutofit/>
           </a:bodyPr>
           <a:lstStyle/>
           <a:p>
             <a:r>
-              <a:rPr lang="en-US" sz="2400" dirty="0" smtClean="0"/>
-              <a:t> M</a:t>
-            </a:r>
-            <a:r>
-              <a:rPr lang="en-US" sz="2400" dirty="0" smtClean="0"/>
-              <a:t>eeting-meeting </a:t>
-            </a:r>
-            <a:r>
-              <a:rPr lang="en-US" sz="2400" dirty="0" smtClean="0"/>
-              <a:t>or </a:t>
-            </a:r>
-            <a:r>
-              <a:rPr lang="en-US" sz="2400" dirty="0" smtClean="0"/>
-              <a:t/>
-            </a:r>
-            <a:br>
-              <a:rPr lang="en-US" sz="2400" dirty="0" smtClean="0"/>
-            </a:br>
-            <a:r>
-              <a:rPr lang="en-US" sz="2400" dirty="0" smtClean="0"/>
+              <a:rPr lang="it-IT" sz="3200" dirty="0" smtClean="0"/>
+              <a:t> Guest</a:t>
+            </a:r>
+          </a:p>
+          <a:p>
+            <a:pPr lvl="1"/>
+            <a:r>
+              <a:rPr lang="it-IT" sz="2800" dirty="0" err="1" smtClean="0"/>
+              <a:t>Registration</a:t>
+            </a:r>
+            <a:endParaRPr lang="it-IT" sz="2800" dirty="0" smtClean="0"/>
+          </a:p>
+          <a:p>
+            <a:r>
+              <a:rPr lang="it-IT" sz="3200" dirty="0" smtClean="0"/>
+              <a:t> User</a:t>
+            </a:r>
+          </a:p>
+          <a:p>
+            <a:pPr lvl="1"/>
+            <a:r>
+              <a:rPr lang="it-IT" sz="3000" dirty="0" smtClean="0"/>
+              <a:t>Login</a:t>
+            </a:r>
+          </a:p>
+          <a:p>
+            <a:pPr lvl="1"/>
+            <a:r>
+              <a:rPr lang="it-IT" sz="3000" dirty="0" smtClean="0"/>
+              <a:t>Create Meeting</a:t>
+            </a:r>
+          </a:p>
+          <a:p>
+            <a:pPr lvl="1"/>
+            <a:r>
+              <a:rPr lang="it-IT" sz="3000" dirty="0" err="1" smtClean="0"/>
+              <a:t>Calendar</a:t>
+            </a:r>
+            <a:endParaRPr lang="it-IT" sz="3000" dirty="0" smtClean="0"/>
+          </a:p>
+          <a:p>
+            <a:pPr lvl="1"/>
+            <a:r>
+              <a:rPr lang="it-IT" sz="3000" dirty="0" err="1" smtClean="0"/>
+              <a:t>Groups</a:t>
+            </a:r>
+            <a:r>
+              <a:rPr lang="it-IT" sz="3000" dirty="0" smtClean="0"/>
+              <a:t> and </a:t>
+            </a:r>
+            <a:r>
+              <a:rPr lang="it-IT" sz="3000" dirty="0" err="1" smtClean="0"/>
+              <a:t>Contacts</a:t>
+            </a:r>
+            <a:endParaRPr lang="it-IT" sz="3000" dirty="0" smtClean="0"/>
+          </a:p>
+          <a:p>
+            <a:r>
+              <a:rPr lang="it-IT" sz="3200" dirty="0" smtClean="0"/>
+              <a:t> Administrator</a:t>
+            </a:r>
+          </a:p>
+          <a:p>
+            <a:pPr lvl="1"/>
+            <a:r>
+              <a:rPr lang="it-IT" sz="3000" dirty="0" err="1" smtClean="0"/>
+              <a:t>Manage</a:t>
+            </a:r>
+            <a:r>
+              <a:rPr lang="it-IT" sz="3000" dirty="0" smtClean="0"/>
+              <a:t> Meeting</a:t>
+            </a:r>
+          </a:p>
+          <a:p>
+            <a:pPr lvl="1"/>
+            <a:r>
+              <a:rPr lang="it-IT" sz="3000" dirty="0" err="1" smtClean="0"/>
+              <a:t>Invite</a:t>
+            </a:r>
+            <a:r>
+              <a:rPr lang="it-IT" sz="3000" dirty="0" smtClean="0"/>
+              <a:t>/</a:t>
+            </a:r>
+            <a:r>
+              <a:rPr lang="it-IT" sz="3000" dirty="0" err="1" smtClean="0"/>
+              <a:t>Remove</a:t>
+            </a:r>
+            <a:r>
+              <a:rPr lang="it-IT" sz="3000" dirty="0" smtClean="0"/>
               <a:t> </a:t>
             </a:r>
             <a:r>
-              <a:rPr lang="en-US" sz="2400" dirty="0" smtClean="0"/>
-              <a:t>default </a:t>
-            </a:r>
-            <a:r>
-              <a:rPr lang="en-US" sz="2400" dirty="0" smtClean="0"/>
-              <a:t>location-meeting </a:t>
-            </a:r>
-          </a:p>
-          <a:p>
-            <a:r>
-              <a:rPr lang="en-US" sz="2400" dirty="0" smtClean="0"/>
-              <a:t> Biking,  Driving,  Walking</a:t>
-            </a:r>
-            <a:r>
-              <a:rPr lang="en-US" sz="2400" dirty="0" smtClean="0"/>
-              <a:t>, </a:t>
-            </a:r>
-            <a:r>
-              <a:rPr lang="en-US" sz="2400" dirty="0" smtClean="0"/>
-              <a:t/>
-            </a:r>
-            <a:br>
-              <a:rPr lang="en-US" sz="2400" dirty="0" smtClean="0"/>
-            </a:br>
-            <a:r>
-              <a:rPr lang="en-US" sz="2400" dirty="0" smtClean="0"/>
-              <a:t> Public </a:t>
-            </a:r>
-            <a:r>
-              <a:rPr lang="en-US" sz="2400" dirty="0" smtClean="0"/>
-              <a:t>Transportation</a:t>
-            </a:r>
-          </a:p>
-          <a:p>
-            <a:r>
-              <a:rPr lang="en-US" sz="2400" dirty="0" smtClean="0"/>
-              <a:t> Preference list</a:t>
-            </a:r>
-            <a:endParaRPr lang="en-US" sz="2400" dirty="0" smtClean="0"/>
-          </a:p>
-          <a:p>
-            <a:r>
-              <a:rPr lang="en-US" sz="2400" dirty="0" smtClean="0"/>
-              <a:t> Constraint</a:t>
-            </a:r>
-            <a:endParaRPr lang="en-US" sz="2400" dirty="0" smtClean="0"/>
-          </a:p>
-          <a:p>
-            <a:r>
-              <a:rPr lang="en-GB" sz="2400" dirty="0" smtClean="0"/>
-              <a:t> Real-time indications</a:t>
-            </a:r>
-            <a:endParaRPr lang="en-US" sz="2400" dirty="0" smtClean="0"/>
-          </a:p>
-        </p:txBody>
-      </p:sp>
-      <p:sp>
-        <p:nvSpPr>
-          <p:cNvPr id="6" name="Segnaposto testo 5"/>
-          <p:cNvSpPr>
-            <a:spLocks noGrp="1"/>
-          </p:cNvSpPr>
-          <p:nvPr>
-            <p:ph type="body" sz="quarter" idx="3"/>
-          </p:nvPr>
-        </p:nvSpPr>
-        <p:spPr>
-          <a:xfrm>
-            <a:off x="6217920" y="1332000"/>
-            <a:ext cx="4937760" cy="576000"/>
-          </a:xfrm>
-        </p:spPr>
-        <p:txBody>
-          <a:bodyPr>
-            <a:normAutofit/>
-          </a:bodyPr>
-          <a:lstStyle/>
-          <a:p>
-            <a:pPr algn="ctr"/>
+              <a:rPr lang="it-IT" sz="3000" dirty="0" err="1" smtClean="0"/>
+              <a:t>Users</a:t>
+            </a:r>
+            <a:endParaRPr lang="it-IT" sz="3000" dirty="0" smtClean="0"/>
+          </a:p>
+          <a:p>
+            <a:pPr lvl="1"/>
+            <a:r>
+              <a:rPr lang="it-IT" sz="3000" dirty="0" err="1" smtClean="0"/>
+              <a:t>Recreate</a:t>
+            </a:r>
+            <a:r>
+              <a:rPr lang="it-IT" sz="3000" dirty="0" smtClean="0"/>
+              <a:t> Meeting</a:t>
+            </a:r>
+          </a:p>
+          <a:p>
+            <a:pPr lvl="1"/>
+            <a:r>
+              <a:rPr lang="it-IT" sz="3000" dirty="0"/>
+              <a:t>M</a:t>
+            </a:r>
+            <a:r>
+              <a:rPr lang="it-IT" sz="3000" dirty="0" smtClean="0"/>
+              <a:t>onitor </a:t>
+            </a:r>
+            <a:r>
+              <a:rPr lang="it-IT" sz="3000" dirty="0" err="1" smtClean="0"/>
+              <a:t>Participants</a:t>
+            </a:r>
+            <a:r>
+              <a:rPr lang="it-IT" sz="3000" dirty="0" smtClean="0"/>
+              <a:t> </a:t>
+            </a:r>
+            <a:r>
+              <a:rPr lang="it-IT" sz="3000" dirty="0" err="1" smtClean="0"/>
+              <a:t>Delays</a:t>
+            </a:r>
+            <a:endParaRPr lang="it-IT" sz="3000" dirty="0"/>
+          </a:p>
+          <a:p>
             <a:r>
               <a:rPr lang="it-IT" sz="3200" dirty="0" smtClean="0"/>
-              <a:t>Meeting</a:t>
-            </a:r>
-            <a:endParaRPr lang="it-IT" sz="3200" dirty="0"/>
-          </a:p>
-        </p:txBody>
-      </p:sp>
-      <p:sp>
-        <p:nvSpPr>
-          <p:cNvPr id="7" name="Segnaposto contenuto 6"/>
-          <p:cNvSpPr>
-            <a:spLocks noGrp="1"/>
-          </p:cNvSpPr>
-          <p:nvPr>
-            <p:ph sz="quarter" idx="4"/>
-          </p:nvPr>
-        </p:nvSpPr>
-        <p:spPr>
-          <a:xfrm>
-            <a:off x="6217920" y="2268000"/>
-            <a:ext cx="4937760" cy="3600000"/>
-          </a:xfrm>
-        </p:spPr>
-        <p:txBody>
-          <a:bodyPr anchor="t">
-            <a:noAutofit/>
-          </a:bodyPr>
-          <a:lstStyle/>
-          <a:p>
-            <a:r>
-              <a:rPr lang="en-GB" sz="2400" dirty="0" smtClean="0"/>
-              <a:t> A </a:t>
-            </a:r>
-            <a:r>
-              <a:rPr lang="en-GB" sz="2400" dirty="0"/>
-              <a:t>title, a date and a </a:t>
-            </a:r>
-            <a:r>
-              <a:rPr lang="en-GB" sz="2400" dirty="0" smtClean="0"/>
-              <a:t>location</a:t>
-            </a:r>
-          </a:p>
-          <a:p>
-            <a:r>
-              <a:rPr lang="en-GB" sz="2400" dirty="0" smtClean="0"/>
-              <a:t> Administrators</a:t>
-            </a:r>
-            <a:endParaRPr lang="en-GB" sz="2400" dirty="0" smtClean="0"/>
-          </a:p>
-          <a:p>
-            <a:r>
-              <a:rPr lang="en-GB" sz="2400" dirty="0" smtClean="0"/>
-              <a:t>Invited users can </a:t>
-            </a:r>
-            <a:r>
-              <a:rPr lang="en-GB" sz="2400" dirty="0"/>
-              <a:t>accept, decline or reschedule </a:t>
-            </a:r>
-            <a:r>
-              <a:rPr lang="en-GB" sz="2400" dirty="0" smtClean="0"/>
-              <a:t>the </a:t>
-            </a:r>
-            <a:r>
-              <a:rPr lang="en-US" sz="2400" dirty="0" smtClean="0"/>
-              <a:t>invitation</a:t>
-            </a:r>
-          </a:p>
-          <a:p>
-            <a:r>
-              <a:rPr lang="en-US" sz="2400" dirty="0" smtClean="0"/>
-              <a:t> Chat</a:t>
-            </a:r>
-            <a:r>
-              <a:rPr lang="en-US" sz="2400" dirty="0" smtClean="0"/>
-              <a:t>, </a:t>
-            </a:r>
-            <a:r>
-              <a:rPr lang="en-GB" sz="2400" dirty="0" smtClean="0"/>
-              <a:t>upload </a:t>
-            </a:r>
-            <a:r>
-              <a:rPr lang="en-GB" sz="2400" dirty="0"/>
-              <a:t>files and </a:t>
-            </a:r>
-            <a:r>
-              <a:rPr lang="en-GB" sz="2400" dirty="0" smtClean="0"/>
-              <a:t>notes</a:t>
-            </a:r>
-            <a:endParaRPr lang="en-GB" sz="2400" dirty="0" smtClean="0"/>
-          </a:p>
-          <a:p>
-            <a:r>
-              <a:rPr lang="en-GB" sz="2400" dirty="0" smtClean="0"/>
-              <a:t> Categories </a:t>
-            </a:r>
-            <a:r>
-              <a:rPr lang="en-GB" sz="2400" dirty="0" smtClean="0"/>
-              <a:t>and subcategories</a:t>
-            </a:r>
-          </a:p>
-          <a:p>
-            <a:r>
-              <a:rPr lang="en-GB" sz="2400" dirty="0" smtClean="0"/>
-              <a:t> Instant Meetings</a:t>
-            </a:r>
-            <a:endParaRPr lang="it-IT" sz="2400" dirty="0"/>
-          </a:p>
-        </p:txBody>
-      </p:sp>
-      <p:sp>
-        <p:nvSpPr>
-          <p:cNvPr id="9" name="Segnaposto numero diapositiva 8"/>
+              <a:t> System Manager</a:t>
+            </a:r>
+          </a:p>
+          <a:p>
+            <a:pPr lvl="1"/>
+            <a:r>
+              <a:rPr lang="it-IT" sz="3000" dirty="0" err="1" smtClean="0"/>
+              <a:t>Travlendar</a:t>
+            </a:r>
+            <a:r>
+              <a:rPr lang="it-IT" sz="3000" dirty="0" smtClean="0"/>
+              <a:t>+ </a:t>
+            </a:r>
+            <a:r>
+              <a:rPr lang="it-IT" sz="3000" dirty="0" err="1" smtClean="0"/>
+              <a:t>employee</a:t>
+            </a:r>
+            <a:endParaRPr lang="it-IT" sz="3000" dirty="0"/>
+          </a:p>
+        </p:txBody>
+      </p:sp>
+      <p:sp>
+        <p:nvSpPr>
+          <p:cNvPr id="10" name="Segnaposto numero diapositiva 9"/>
           <p:cNvSpPr>
             <a:spLocks noGrp="1"/>
           </p:cNvSpPr>
@@ -9417,42 +9031,10 @@
           </a:p>
         </p:txBody>
       </p:sp>
-      <p:sp>
-        <p:nvSpPr>
-          <p:cNvPr id="3" name="Titolo 2"/>
-          <p:cNvSpPr>
-            <a:spLocks noGrp="1"/>
-          </p:cNvSpPr>
-          <p:nvPr>
-            <p:ph type="title"/>
-          </p:nvPr>
-        </p:nvSpPr>
-        <p:spPr/>
-        <p:txBody>
-          <a:bodyPr/>
-          <a:lstStyle/>
-          <a:p>
-            <a:pPr algn="ctr"/>
-            <a:r>
-              <a:rPr lang="it-IT" dirty="0" err="1" smtClean="0"/>
-              <a:t>Product</a:t>
-            </a:r>
-            <a:r>
-              <a:rPr lang="it-IT" dirty="0" smtClean="0"/>
-              <a:t> </a:t>
-            </a:r>
-            <a:r>
-              <a:rPr lang="en-US" dirty="0" smtClean="0"/>
-              <a:t>Functions</a:t>
-            </a:r>
-            <a:endParaRPr lang="en-US" dirty="0"/>
-          </a:p>
-        </p:txBody>
-      </p:sp>
     </p:spTree>
     <p:extLst>
       <p:ext uri="{BB962C8B-B14F-4D97-AF65-F5344CB8AC3E}">
-        <p14:creationId xmlns:p14="http://schemas.microsoft.com/office/powerpoint/2010/main" xmlns="" val="3700084062"/>
+        <p14:creationId xmlns:p14="http://schemas.microsoft.com/office/powerpoint/2010/main" val="259778103"/>
       </p:ext>
     </p:extLst>
   </p:cSld>
@@ -9488,7 +9070,7 @@
       </p:grpSpPr>
       <p:sp>
         <p:nvSpPr>
-          <p:cNvPr id="7" name="Titolo 6"/>
+          <p:cNvPr id="2" name="Titolo 1"/>
           <p:cNvSpPr>
             <a:spLocks noGrp="1"/>
           </p:cNvSpPr>
@@ -9503,20 +9085,16 @@
           <a:p>
             <a:pPr algn="ctr"/>
             <a:r>
-              <a:rPr lang="it-IT" smtClean="0"/>
-              <a:t>User </a:t>
-            </a:r>
-            <a:r>
-              <a:rPr lang="it-IT" err="1" smtClean="0"/>
-              <a:t>Characteristics</a:t>
-            </a:r>
-            <a:endParaRPr lang="it-IT"/>
-          </a:p>
-        </p:txBody>
-      </p:sp>
-      <p:sp>
-        <p:nvSpPr>
-          <p:cNvPr id="8" name="Segnaposto contenuto 7"/>
+              <a:rPr lang="it-IT" dirty="0" err="1" smtClean="0"/>
+              <a:t>Goals</a:t>
+            </a:r>
+            <a:endParaRPr lang="it-IT" dirty="0"/>
+          </a:p>
+        </p:txBody>
+      </p:sp>
+      <p:sp>
+        <p:nvSpPr>
+          <p:cNvPr id="3" name="Segnaposto contenuto 2"/>
           <p:cNvSpPr>
             <a:spLocks noGrp="1"/>
           </p:cNvSpPr>
@@ -9526,48 +9104,109 @@
         </p:nvSpPr>
         <p:spPr>
           <a:xfrm>
-            <a:off x="1097279" y="1478844"/>
-            <a:ext cx="10090009" cy="4064000"/>
+            <a:off x="1097280" y="1286932"/>
+            <a:ext cx="10058400" cy="4945617"/>
           </a:xfrm>
         </p:spPr>
         <p:txBody>
           <a:bodyPr>
-            <a:normAutofit/>
+            <a:normAutofit lnSpcReduction="10000"/>
           </a:bodyPr>
           <a:lstStyle/>
           <a:p>
             <a:r>
-              <a:rPr lang="it-IT" sz="3200" dirty="0" err="1" smtClean="0"/>
-              <a:t>Guest</a:t>
-            </a:r>
-            <a:endParaRPr lang="it-IT" sz="3000" dirty="0" smtClean="0"/>
-          </a:p>
-          <a:p>
-            <a:r>
-              <a:rPr lang="it-IT" sz="3200" dirty="0" err="1" smtClean="0"/>
-              <a:t>User</a:t>
-            </a:r>
-            <a:endParaRPr lang="it-IT" sz="3200" dirty="0" smtClean="0"/>
-          </a:p>
-          <a:p>
-            <a:r>
-              <a:rPr lang="it-IT" sz="3200" dirty="0" err="1" smtClean="0"/>
-              <a:t>Administrator</a:t>
-            </a:r>
-            <a:endParaRPr lang="it-IT" sz="3200" dirty="0" smtClean="0"/>
-          </a:p>
-          <a:p>
-            <a:r>
-              <a:rPr lang="it-IT" sz="3200" dirty="0" smtClean="0"/>
-              <a:t>System Manager</a:t>
-            </a:r>
-            <a:endParaRPr lang="it-IT" sz="3200" dirty="0"/>
-          </a:p>
-        </p:txBody>
-      </p:sp>
-      <p:sp>
-        <p:nvSpPr>
-          <p:cNvPr id="10" name="Segnaposto numero diapositiva 9"/>
+              <a:rPr lang="en-US" dirty="0" smtClean="0"/>
+              <a:t> G1 </a:t>
+            </a:r>
+            <a:r>
+              <a:rPr lang="en-US" dirty="0" smtClean="0"/>
+              <a:t>Allow someone to visit the homepage of the system and to register himself providing a valid email, a password and a unique nickname. As an alternative, an external login provider, such as Google+, can be used.</a:t>
+            </a:r>
+          </a:p>
+          <a:p>
+            <a:r>
+              <a:rPr lang="en-US" dirty="0" smtClean="0"/>
+              <a:t> G2 </a:t>
+            </a:r>
+            <a:r>
+              <a:rPr lang="en-US" dirty="0" smtClean="0"/>
+              <a:t>Users can log into the system.</a:t>
+            </a:r>
+          </a:p>
+          <a:p>
+            <a:r>
+              <a:rPr lang="en-US" dirty="0" smtClean="0"/>
+              <a:t> G3 </a:t>
+            </a:r>
+            <a:r>
+              <a:rPr lang="en-US" dirty="0" smtClean="0"/>
+              <a:t>Allow a user to visit its profile and to see a detailed schedule of any day containing all the meetings he is attending and all the travels the system has planned him.</a:t>
+            </a:r>
+          </a:p>
+          <a:p>
+            <a:r>
+              <a:rPr lang="en-US" dirty="0" smtClean="0"/>
+              <a:t> G4 </a:t>
+            </a:r>
+            <a:r>
+              <a:rPr lang="en-US" dirty="0" smtClean="0"/>
+              <a:t>Allow a user to edit all information in its profile (e.g. displayed name, phone number, company</a:t>
+            </a:r>
+            <a:r>
+              <a:rPr lang="en-US" dirty="0" smtClean="0"/>
+              <a:t>, website</a:t>
+            </a:r>
+            <a:r>
+              <a:rPr lang="en-US" dirty="0" smtClean="0"/>
+              <a:t>, social accounts).</a:t>
+            </a:r>
+          </a:p>
+          <a:p>
+            <a:r>
+              <a:rPr lang="en-US" dirty="0" smtClean="0"/>
+              <a:t> G5 </a:t>
+            </a:r>
+            <a:r>
+              <a:rPr lang="en-US" dirty="0" smtClean="0"/>
+              <a:t>Allow a user to create a meeting and to invite other users to attend it.</a:t>
+            </a:r>
+          </a:p>
+          <a:p>
+            <a:r>
+              <a:rPr lang="en-US" dirty="0" smtClean="0"/>
+              <a:t> G6 </a:t>
+            </a:r>
+            <a:r>
+              <a:rPr lang="en-US" dirty="0" smtClean="0"/>
+              <a:t>Create a warning each time it is not possible to reach a meeting location from the previous one in time.</a:t>
+            </a:r>
+          </a:p>
+          <a:p>
+            <a:r>
+              <a:rPr lang="en-US" dirty="0" smtClean="0"/>
+              <a:t> G7 </a:t>
+            </a:r>
+            <a:r>
+              <a:rPr lang="en-US" dirty="0" smtClean="0"/>
+              <a:t>Allow a user to specify flexible breaks during the day.</a:t>
+            </a:r>
+          </a:p>
+          <a:p>
+            <a:r>
+              <a:rPr lang="en-US" dirty="0" smtClean="0"/>
+              <a:t> G8 </a:t>
+            </a:r>
+            <a:r>
+              <a:rPr lang="en-US" dirty="0" smtClean="0"/>
+              <a:t>Manage users’ travels between subsequent meetings, suggesting the best mobility option according to their preference list.</a:t>
+            </a:r>
+            <a:endParaRPr lang="it-IT" dirty="0"/>
+          </a:p>
+        </p:txBody>
+      </p:sp>
+      <p:sp>
+        <p:nvSpPr>
+          <p:cNvPr id="5" name="Segnaposto numero diapositiva 4"/>
           <p:cNvSpPr>
             <a:spLocks noGrp="1"/>
           </p:cNvSpPr>
@@ -9589,50 +9228,10 @@
           </a:p>
         </p:txBody>
       </p:sp>
-      <p:sp>
-        <p:nvSpPr>
-          <p:cNvPr id="5" name="Stella a 5 punte 4"/>
-          <p:cNvSpPr/>
-          <p:nvPr/>
-        </p:nvSpPr>
-        <p:spPr>
-          <a:xfrm>
-            <a:off x="6513689" y="1411111"/>
-            <a:ext cx="4289778" cy="3973689"/>
-          </a:xfrm>
-          <a:prstGeom prst="star5">
-            <a:avLst/>
-          </a:prstGeom>
-        </p:spPr>
-        <p:style>
-          <a:lnRef idx="2">
-            <a:schemeClr val="accent1">
-              <a:shade val="50000"/>
-            </a:schemeClr>
-          </a:lnRef>
-          <a:fillRef idx="1">
-            <a:schemeClr val="accent1"/>
-          </a:fillRef>
-          <a:effectRef idx="0">
-            <a:schemeClr val="accent1"/>
-          </a:effectRef>
-          <a:fontRef idx="minor">
-            <a:schemeClr val="lt1"/>
-          </a:fontRef>
-        </p:style>
-        <p:txBody>
-          <a:bodyPr rtlCol="0" anchor="ctr"/>
-          <a:lstStyle/>
-          <a:p>
-            <a:pPr algn="ctr"/>
-            <a:endParaRPr lang="it-IT"/>
-          </a:p>
-        </p:txBody>
-      </p:sp>
     </p:spTree>
     <p:extLst>
       <p:ext uri="{BB962C8B-B14F-4D97-AF65-F5344CB8AC3E}">
-        <p14:creationId xmlns:p14="http://schemas.microsoft.com/office/powerpoint/2010/main" xmlns="" val="259778103"/>
+        <p14:creationId xmlns:p14="http://schemas.microsoft.com/office/powerpoint/2010/main" val="1088997913"/>
       </p:ext>
     </p:extLst>
   </p:cSld>
@@ -9714,49 +9313,93 @@
           <a:p>
             <a:r>
               <a:rPr lang="en-US" dirty="0" smtClean="0"/>
-              <a:t>G1 Allow someone to visit the homepage of the system and to register himself providing a valid email, a password and a unique nickname. As an alternative, an external login provider, such as Google+, can be used.</a:t>
-            </a:r>
-          </a:p>
-          <a:p>
+              <a:t> G1 </a:t>
+            </a:r>
             <a:r>
               <a:rPr lang="en-US" dirty="0" smtClean="0"/>
-              <a:t>G2 Users can log into the system.</a:t>
-            </a:r>
-          </a:p>
-          <a:p>
+              <a:t>Allow someone to visit the homepage of the system and to register himself providing a valid </a:t>
+            </a:r>
             <a:r>
               <a:rPr lang="en-US" dirty="0" smtClean="0"/>
-              <a:t>G3 Allow a user to visit its profile and to see a detailed schedule of any day containing all the meetings he is attending and all the travels the system has planned him.</a:t>
-            </a:r>
-          </a:p>
-          <a:p>
+              <a:t>email</a:t>
+            </a:r>
             <a:r>
               <a:rPr lang="en-US" dirty="0" smtClean="0"/>
-              <a:t>G4 Allow a user to edit all information in its profile (e.g. displayed name, phone number, company, website, social accounts).</a:t>
+              <a:t>, a password and a unique nickname. As an alternative, an external login provider, such as Google+, can be used.</a:t>
             </a:r>
           </a:p>
           <a:p>
             <a:r>
               <a:rPr lang="en-US" dirty="0" smtClean="0"/>
-              <a:t>G5 Allow a user to create a meeting and to invite other users to attend it.</a:t>
-            </a:r>
-          </a:p>
-          <a:p>
+              <a:t> G2 </a:t>
+            </a:r>
             <a:r>
               <a:rPr lang="en-US" dirty="0" smtClean="0"/>
-              <a:t>G6 Create a warning each time it is not possible to reach a meeting location from the previous one in time.</a:t>
+              <a:t>Users can log into the system.</a:t>
             </a:r>
           </a:p>
           <a:p>
             <a:r>
               <a:rPr lang="en-US" dirty="0" smtClean="0"/>
-              <a:t>G7 Allow a user to specify flexible breaks during the day.</a:t>
-            </a:r>
-          </a:p>
-          <a:p>
+              <a:t> G3 </a:t>
+            </a:r>
             <a:r>
               <a:rPr lang="en-US" dirty="0" smtClean="0"/>
-              <a:t>G8 Manage users’ travels between subsequent meetings, suggesting the best mobility option according to their preference list.</a:t>
+              <a:t>Allow a user to visit its profile and to see a detailed schedule of any day containing all the meetings he is attending and all the travels the system has planned him.</a:t>
+            </a:r>
+          </a:p>
+          <a:p>
+            <a:r>
+              <a:rPr lang="en-US" dirty="0" smtClean="0"/>
+              <a:t> G4 </a:t>
+            </a:r>
+            <a:r>
+              <a:rPr lang="en-US" dirty="0" smtClean="0"/>
+              <a:t>Allow a user to edit all information in its profile (e.g. displayed name, phone number, company, website, social accounts).</a:t>
+            </a:r>
+          </a:p>
+          <a:p>
+            <a:r>
+              <a:rPr lang="en-US" b="1" dirty="0" smtClean="0"/>
+              <a:t> G5 </a:t>
+            </a:r>
+            <a:r>
+              <a:rPr lang="en-US" b="1" dirty="0" smtClean="0"/>
+              <a:t>Allow a user to create a meeting and to invite other users to attend it.</a:t>
+            </a:r>
+          </a:p>
+          <a:p>
+            <a:r>
+              <a:rPr lang="en-US" dirty="0" smtClean="0"/>
+              <a:t> G6 </a:t>
+            </a:r>
+            <a:r>
+              <a:rPr lang="en-US" dirty="0" smtClean="0"/>
+              <a:t>Create a warning each time it is not possible to reach a meeting location from the previous one in time.</a:t>
+            </a:r>
+          </a:p>
+          <a:p>
+            <a:r>
+              <a:rPr lang="en-US" b="1" dirty="0" smtClean="0"/>
+              <a:t> G7 </a:t>
+            </a:r>
+            <a:r>
+              <a:rPr lang="en-US" b="1" dirty="0" smtClean="0"/>
+              <a:t>Allow a user to specify flexible breaks during the day.</a:t>
+            </a:r>
+          </a:p>
+          <a:p>
+            <a:r>
+              <a:rPr lang="en-US" b="1" dirty="0" smtClean="0"/>
+              <a:t> G8 </a:t>
+            </a:r>
+            <a:r>
+              <a:rPr lang="en-US" b="1" dirty="0" smtClean="0"/>
+              <a:t>Manage users’ travels between subsequent meetings, suggesting the best mobility option according to their preference list</a:t>
+            </a:r>
+            <a:r>
+              <a:rPr lang="en-US" dirty="0" smtClean="0"/>
+              <a:t>.</a:t>
             </a:r>
             <a:endParaRPr lang="it-IT" dirty="0"/>
           </a:p>
@@ -9789,7 +9432,7 @@
     </p:spTree>
     <p:extLst>
       <p:ext uri="{BB962C8B-B14F-4D97-AF65-F5344CB8AC3E}">
-        <p14:creationId xmlns:p14="http://schemas.microsoft.com/office/powerpoint/2010/main" xmlns="" val="1088997913"/>
+        <p14:creationId xmlns:p14="http://schemas.microsoft.com/office/powerpoint/2010/main" val="1088997913"/>
       </p:ext>
     </p:extLst>
   </p:cSld>
@@ -9833,91 +9476,234 @@
             <p:ph type="title"/>
           </p:nvPr>
         </p:nvSpPr>
-        <p:spPr/>
-        <p:txBody>
-          <a:bodyPr/>
-          <a:lstStyle/>
-          <a:p>
-            <a:pPr algn="ctr"/>
-            <a:r>
-              <a:rPr lang="it-IT" dirty="0" err="1" smtClean="0"/>
-              <a:t>Goals</a:t>
-            </a:r>
-            <a:endParaRPr lang="it-IT" dirty="0"/>
-          </a:p>
-        </p:txBody>
-      </p:sp>
-      <p:sp>
-        <p:nvSpPr>
-          <p:cNvPr id="3" name="Segnaposto contenuto 2"/>
-          <p:cNvSpPr>
-            <a:spLocks noGrp="1"/>
-          </p:cNvSpPr>
-          <p:nvPr>
-            <p:ph idx="1"/>
-          </p:nvPr>
-        </p:nvSpPr>
         <p:spPr>
           <a:xfrm>
-            <a:off x="1097280" y="1286932"/>
-            <a:ext cx="10058400" cy="4945617"/>
+            <a:off x="0" y="-444791"/>
+            <a:ext cx="12192000" cy="1450757"/>
           </a:xfrm>
         </p:spPr>
         <p:txBody>
           <a:bodyPr>
-            <a:normAutofit lnSpcReduction="10000"/>
+            <a:normAutofit/>
           </a:bodyPr>
           <a:lstStyle/>
           <a:p>
+            <a:pPr algn="ctr"/>
+            <a:r>
+              <a:rPr lang="en-US" dirty="0"/>
+              <a:t>Allow a user to create </a:t>
+            </a:r>
             <a:r>
               <a:rPr lang="en-US" dirty="0" smtClean="0"/>
-              <a:t>G1 Allow someone to visit the homepage of the system and to register himself providing a valid email, a password and a unique nickname. As an alternative, an external login provider, such as Google+, can be used.</a:t>
-            </a:r>
-          </a:p>
+              <a:t>a meeting</a:t>
+            </a:r>
+            <a:endParaRPr lang="it-IT" dirty="0"/>
+          </a:p>
+        </p:txBody>
+      </p:sp>
+      <p:sp>
+        <p:nvSpPr>
+          <p:cNvPr id="3" name="Segnaposto contenuto 2"/>
+          <p:cNvSpPr>
+            <a:spLocks noGrp="1"/>
+          </p:cNvSpPr>
+          <p:nvPr>
+            <p:ph idx="1"/>
+          </p:nvPr>
+        </p:nvSpPr>
+        <p:spPr>
+          <a:xfrm>
+            <a:off x="1097280" y="1309510"/>
+            <a:ext cx="10058400" cy="4923039"/>
+          </a:xfrm>
+        </p:spPr>
+        <p:txBody>
+          <a:bodyPr>
+            <a:normAutofit fontScale="92500" lnSpcReduction="20000"/>
+          </a:bodyPr>
+          <a:lstStyle/>
           <a:p>
             <a:r>
               <a:rPr lang="en-US" dirty="0" smtClean="0"/>
-              <a:t>G2 Users can log into the system.</a:t>
+              <a:t> G5.1 </a:t>
+            </a:r>
+            <a:r>
+              <a:rPr lang="en-US" dirty="0"/>
+              <a:t>Allow the administrator to categorize the meeting.</a:t>
             </a:r>
           </a:p>
           <a:p>
             <a:r>
               <a:rPr lang="en-US" dirty="0" smtClean="0"/>
-              <a:t>G3 Allow a user to visit its profile and to see a detailed schedule of any day containing all the meetings he is attending and all the travels the system has planned him.</a:t>
+              <a:t> G5.2 </a:t>
+            </a:r>
+            <a:r>
+              <a:rPr lang="en-US" dirty="0"/>
+              <a:t>Allow the administrator to change title, abstract and location of the meeting.</a:t>
             </a:r>
           </a:p>
           <a:p>
             <a:r>
               <a:rPr lang="en-US" dirty="0" smtClean="0"/>
-              <a:t>G4 Allow a user to edit all information in its profile (e.g. displayed name, phone number, company, website, social accounts).</a:t>
-            </a:r>
-          </a:p>
-          <a:p>
-            <a:r>
-              <a:rPr lang="en-US" b="1" dirty="0" smtClean="0"/>
-              <a:t>G5 Allow a user to create a meeting and to invite other users to attend it.</a:t>
+              <a:t> G5.3 </a:t>
+            </a:r>
+            <a:r>
+              <a:rPr lang="en-US" dirty="0"/>
+              <a:t>Allow the administrator to nominate other administrators.</a:t>
             </a:r>
           </a:p>
           <a:p>
             <a:r>
               <a:rPr lang="en-US" dirty="0" smtClean="0"/>
-              <a:t>G6 Create a warning each time it is not possible to reach a meeting location from the previous one in time.</a:t>
-            </a:r>
-          </a:p>
-          <a:p>
-            <a:r>
-              <a:rPr lang="en-US" b="1" dirty="0" smtClean="0"/>
-              <a:t>G7 Allow a user to specify flexible breaks during the day.</a:t>
-            </a:r>
-          </a:p>
-          <a:p>
-            <a:r>
-              <a:rPr lang="en-US" b="1" dirty="0" smtClean="0"/>
-              <a:t>G8 Manage users’ travels between subsequent meetings, suggesting the best mobility option according to their preference list</a:t>
-            </a:r>
+              <a:t> G5.4 </a:t>
+            </a:r>
+            <a:r>
+              <a:rPr lang="en-US" dirty="0"/>
+              <a:t>Allow the administrator to send invitations and remove participants.</a:t>
+            </a:r>
+          </a:p>
+          <a:p>
             <a:r>
               <a:rPr lang="en-US" dirty="0" smtClean="0"/>
+              <a:t> G5.5 </a:t>
+            </a:r>
+            <a:r>
+              <a:rPr lang="en-US" dirty="0"/>
+              <a:t>Allow the team to communicate between them, to share files and to save personal </a:t>
+            </a:r>
+            <a:r>
+              <a:rPr lang="en-US" dirty="0" smtClean="0"/>
+              <a:t>notes </a:t>
+            </a:r>
+            <a:r>
+              <a:rPr lang="it-IT" dirty="0" err="1" smtClean="0"/>
+              <a:t>about</a:t>
+            </a:r>
+            <a:r>
+              <a:rPr lang="it-IT" dirty="0" smtClean="0"/>
+              <a:t> the </a:t>
+            </a:r>
+            <a:r>
+              <a:rPr lang="it-IT" dirty="0"/>
+              <a:t>meeting.</a:t>
+            </a:r>
+          </a:p>
+          <a:p>
+            <a:r>
+              <a:rPr lang="en-US" dirty="0" smtClean="0"/>
+              <a:t> G5.6 </a:t>
+            </a:r>
+            <a:r>
+              <a:rPr lang="en-US" dirty="0"/>
+              <a:t>Allow the invited users to accept or decline the meeting or to propose a rescheduling in </a:t>
+            </a:r>
+            <a:r>
+              <a:rPr lang="en-US" dirty="0" smtClean="0"/>
+              <a:t>a </a:t>
+            </a:r>
+            <a:r>
+              <a:rPr lang="it-IT" dirty="0" err="1" smtClean="0"/>
+              <a:t>different</a:t>
+            </a:r>
+            <a:r>
+              <a:rPr lang="it-IT" dirty="0" smtClean="0"/>
+              <a:t> </a:t>
+            </a:r>
+            <a:r>
+              <a:rPr lang="it-IT" dirty="0" err="1"/>
+              <a:t>time</a:t>
+            </a:r>
+            <a:r>
+              <a:rPr lang="it-IT" dirty="0"/>
+              <a:t> slot.</a:t>
+            </a:r>
+          </a:p>
+          <a:p>
+            <a:r>
+              <a:rPr lang="en-US" dirty="0" smtClean="0"/>
+              <a:t> G5.7 </a:t>
+            </a:r>
+            <a:r>
+              <a:rPr lang="en-US" dirty="0"/>
+              <a:t>Allow the administrator to change the date of the meeting after a rescheduling has </a:t>
+            </a:r>
+            <a:r>
+              <a:rPr lang="en-US" dirty="0" smtClean="0"/>
+              <a:t>been </a:t>
+            </a:r>
+            <a:r>
+              <a:rPr lang="it-IT" dirty="0" err="1" smtClean="0"/>
+              <a:t>proposed</a:t>
+            </a:r>
+            <a:r>
+              <a:rPr lang="it-IT" dirty="0"/>
               <a:t>.</a:t>
+            </a:r>
+          </a:p>
+          <a:p>
+            <a:r>
+              <a:rPr lang="en-US" dirty="0" smtClean="0"/>
+              <a:t> G5.8 </a:t>
+            </a:r>
+            <a:r>
+              <a:rPr lang="en-US" dirty="0"/>
+              <a:t>Allow the administrator to poll the team to reschedule the meeting; if everyone accepts </a:t>
+            </a:r>
+            <a:r>
+              <a:rPr lang="en-US" dirty="0" smtClean="0"/>
+              <a:t>the </a:t>
+            </a:r>
+            <a:r>
+              <a:rPr lang="it-IT" dirty="0" err="1" smtClean="0"/>
+              <a:t>rescheduling</a:t>
+            </a:r>
+            <a:r>
+              <a:rPr lang="it-IT" dirty="0"/>
+              <a:t>, the date </a:t>
+            </a:r>
+            <a:r>
+              <a:rPr lang="it-IT" dirty="0" err="1"/>
+              <a:t>changes</a:t>
+            </a:r>
+            <a:r>
+              <a:rPr lang="it-IT" dirty="0"/>
+              <a:t>.</a:t>
+            </a:r>
+          </a:p>
+          <a:p>
+            <a:r>
+              <a:rPr lang="en-US" dirty="0" smtClean="0"/>
+              <a:t> G5.9 </a:t>
+            </a:r>
+            <a:r>
+              <a:rPr lang="en-US" dirty="0"/>
+              <a:t>Allow the administrator to create a copy of a meeting with the same team and settings </a:t>
+            </a:r>
+            <a:r>
+              <a:rPr lang="en-US" dirty="0" smtClean="0"/>
+              <a:t>on </a:t>
+            </a:r>
+            <a:r>
+              <a:rPr lang="it-IT" dirty="0" err="1" smtClean="0"/>
+              <a:t>another</a:t>
+            </a:r>
+            <a:r>
+              <a:rPr lang="it-IT" dirty="0" smtClean="0"/>
+              <a:t> </a:t>
+            </a:r>
+            <a:r>
+              <a:rPr lang="it-IT" dirty="0"/>
+              <a:t>date.</a:t>
+            </a:r>
+          </a:p>
+          <a:p>
+            <a:r>
+              <a:rPr lang="en-US" dirty="0" smtClean="0"/>
+              <a:t> G5.10 </a:t>
+            </a:r>
+            <a:r>
+              <a:rPr lang="en-US" dirty="0"/>
+              <a:t>Allow the administrator to see who’s late at the meeting.</a:t>
             </a:r>
             <a:endParaRPr lang="it-IT" dirty="0"/>
           </a:p>
@@ -9950,7 +9736,7 @@
     </p:spTree>
     <p:extLst>
       <p:ext uri="{BB962C8B-B14F-4D97-AF65-F5344CB8AC3E}">
-        <p14:creationId xmlns:p14="http://schemas.microsoft.com/office/powerpoint/2010/main" xmlns="" val="1088997913"/>
+        <p14:creationId xmlns:p14="http://schemas.microsoft.com/office/powerpoint/2010/main" val="1068353532"/>
       </p:ext>
     </p:extLst>
   </p:cSld>
@@ -10008,220 +9794,8 @@
           <a:p>
             <a:pPr algn="ctr"/>
             <a:r>
-              <a:rPr lang="en-US" dirty="0"/>
-              <a:t>Allow a user to create </a:t>
-            </a:r>
-            <a:r>
               <a:rPr lang="en-US" dirty="0" smtClean="0"/>
-              <a:t>a meeting</a:t>
-            </a:r>
-            <a:endParaRPr lang="it-IT" dirty="0"/>
-          </a:p>
-        </p:txBody>
-      </p:sp>
-      <p:sp>
-        <p:nvSpPr>
-          <p:cNvPr id="3" name="Segnaposto contenuto 2"/>
-          <p:cNvSpPr>
-            <a:spLocks noGrp="1"/>
-          </p:cNvSpPr>
-          <p:nvPr>
-            <p:ph idx="1"/>
-          </p:nvPr>
-        </p:nvSpPr>
-        <p:spPr>
-          <a:xfrm>
-            <a:off x="1097280" y="1309510"/>
-            <a:ext cx="10058400" cy="4923039"/>
-          </a:xfrm>
-        </p:spPr>
-        <p:txBody>
-          <a:bodyPr>
-            <a:normAutofit fontScale="92500" lnSpcReduction="20000"/>
-          </a:bodyPr>
-          <a:lstStyle/>
-          <a:p>
-            <a:r>
-              <a:rPr lang="en-US" dirty="0" smtClean="0"/>
-              <a:t> G5.1 </a:t>
-            </a:r>
-            <a:r>
-              <a:rPr lang="en-US" dirty="0"/>
-              <a:t>Allow the administrator to categorize the meeting.</a:t>
-            </a:r>
-          </a:p>
-          <a:p>
-            <a:r>
-              <a:rPr lang="en-US" dirty="0" smtClean="0"/>
-              <a:t> G5.2 </a:t>
-            </a:r>
-            <a:r>
-              <a:rPr lang="en-US" dirty="0"/>
-              <a:t>Allow the administrator to change title, abstract and location of the meeting.</a:t>
-            </a:r>
-          </a:p>
-          <a:p>
-            <a:r>
-              <a:rPr lang="en-US" dirty="0" smtClean="0"/>
-              <a:t> G5.3 </a:t>
-            </a:r>
-            <a:r>
-              <a:rPr lang="en-US" dirty="0"/>
-              <a:t>Allow the administrator to nominate other administrators.</a:t>
-            </a:r>
-          </a:p>
-          <a:p>
-            <a:r>
-              <a:rPr lang="en-US" dirty="0" smtClean="0"/>
-              <a:t> G5.4 </a:t>
-            </a:r>
-            <a:r>
-              <a:rPr lang="en-US" dirty="0"/>
-              <a:t>Allow the administrator to send invitations and remove participants.</a:t>
-            </a:r>
-          </a:p>
-          <a:p>
-            <a:r>
-              <a:rPr lang="en-US" dirty="0" smtClean="0"/>
-              <a:t> G5.5 </a:t>
-            </a:r>
-            <a:r>
-              <a:rPr lang="en-US" dirty="0"/>
-              <a:t>Allow the team to communicate between them, to share files and to save personal </a:t>
-            </a:r>
-            <a:r>
-              <a:rPr lang="en-US" dirty="0" smtClean="0"/>
-              <a:t>notes </a:t>
-            </a:r>
-            <a:r>
-              <a:rPr lang="it-IT" dirty="0" err="1" smtClean="0"/>
-              <a:t>about</a:t>
-            </a:r>
-            <a:r>
-              <a:rPr lang="it-IT" dirty="0" smtClean="0"/>
-              <a:t> the </a:t>
-            </a:r>
-            <a:r>
-              <a:rPr lang="it-IT" dirty="0"/>
-              <a:t>meeting.</a:t>
-            </a:r>
-          </a:p>
-          <a:p>
-            <a:r>
-              <a:rPr lang="en-US" dirty="0" smtClean="0"/>
-              <a:t> G5.6 </a:t>
-            </a:r>
-            <a:r>
-              <a:rPr lang="en-US" dirty="0"/>
-              <a:t>Allow the invited users to accept or decline the meeting or to propose a rescheduling in </a:t>
-            </a:r>
-            <a:r>
-              <a:rPr lang="en-US" dirty="0" smtClean="0"/>
-              <a:t>a </a:t>
-            </a:r>
-            <a:r>
-              <a:rPr lang="it-IT" dirty="0" err="1" smtClean="0"/>
-              <a:t>different</a:t>
-            </a:r>
-            <a:r>
-              <a:rPr lang="it-IT" dirty="0" smtClean="0"/>
-              <a:t> </a:t>
-            </a:r>
-            <a:r>
-              <a:rPr lang="it-IT" dirty="0" err="1"/>
-              <a:t>time</a:t>
-            </a:r>
-            <a:r>
-              <a:rPr lang="it-IT" dirty="0"/>
-              <a:t> slot.</a:t>
-            </a:r>
-          </a:p>
-          <a:p>
-            <a:r>
-              <a:rPr lang="en-US" dirty="0" smtClean="0"/>
-              <a:t> G5.7 </a:t>
-            </a:r>
-            <a:r>
-              <a:rPr lang="en-US" dirty="0"/>
-              <a:t>Allow the administrator to change the date of the meeting after a rescheduling has </a:t>
-            </a:r>
-            <a:r>
-              <a:rPr lang="en-US" dirty="0" smtClean="0"/>
-              <a:t>been </a:t>
-            </a:r>
-            <a:r>
-              <a:rPr lang="it-IT" dirty="0" err="1" smtClean="0"/>
-              <a:t>proposed</a:t>
-            </a:r>
-            <a:r>
-              <a:rPr lang="it-IT" dirty="0"/>
-              <a:t>.</a:t>
-            </a:r>
-          </a:p>
-          <a:p>
-            <a:r>
-              <a:rPr lang="en-US" dirty="0" smtClean="0"/>
-              <a:t> G5.8 </a:t>
-            </a:r>
-            <a:r>
-              <a:rPr lang="en-US" dirty="0"/>
-              <a:t>Allow the administrator to poll the team to reschedule the meeting; if everyone accepts </a:t>
-            </a:r>
-            <a:r>
-              <a:rPr lang="en-US" dirty="0" smtClean="0"/>
-              <a:t>the </a:t>
-            </a:r>
-            <a:r>
-              <a:rPr lang="it-IT" dirty="0" err="1" smtClean="0"/>
-              <a:t>rescheduling</a:t>
-            </a:r>
-            <a:r>
-              <a:rPr lang="it-IT" dirty="0"/>
-              <a:t>, the date </a:t>
-            </a:r>
-            <a:r>
-              <a:rPr lang="it-IT" dirty="0" err="1"/>
-              <a:t>changes</a:t>
-            </a:r>
-            <a:r>
-              <a:rPr lang="it-IT" dirty="0"/>
-              <a:t>.</a:t>
-            </a:r>
-          </a:p>
-          <a:p>
-            <a:r>
-              <a:rPr lang="en-US" dirty="0" smtClean="0"/>
-              <a:t> G5.9 </a:t>
-            </a:r>
-            <a:r>
-              <a:rPr lang="en-US" dirty="0"/>
-              <a:t>Allow the administrator to create a copy of a meeting with the same team and settings </a:t>
-            </a:r>
-            <a:r>
-              <a:rPr lang="en-US" dirty="0" smtClean="0"/>
-              <a:t>on </a:t>
-            </a:r>
-            <a:r>
-              <a:rPr lang="it-IT" dirty="0" err="1" smtClean="0"/>
-              <a:t>another</a:t>
-            </a:r>
-            <a:r>
-              <a:rPr lang="it-IT" dirty="0" smtClean="0"/>
-              <a:t> </a:t>
-            </a:r>
-            <a:r>
-              <a:rPr lang="it-IT" dirty="0"/>
-              <a:t>date.</a:t>
-            </a:r>
-          </a:p>
-          <a:p>
-            <a:r>
-              <a:rPr lang="en-US" dirty="0" smtClean="0"/>
-              <a:t> G5.10 </a:t>
-            </a:r>
-            <a:r>
-              <a:rPr lang="en-US" dirty="0"/>
-              <a:t>Allow the administrator to see who’s late at the meeting.</a:t>
+              <a:t>Allow a user to create a meeting</a:t>
             </a:r>
             <a:endParaRPr lang="it-IT" dirty="0"/>
           </a:p>
@@ -10251,10 +9825,115 @@
           </a:p>
         </p:txBody>
       </p:sp>
+      <p:sp>
+        <p:nvSpPr>
+          <p:cNvPr id="4" name="Segnaposto contenuto 3"/>
+          <p:cNvSpPr>
+            <a:spLocks noGrp="1"/>
+          </p:cNvSpPr>
+          <p:nvPr>
+            <p:ph idx="1"/>
+          </p:nvPr>
+        </p:nvSpPr>
+        <p:spPr>
+          <a:xfrm>
+            <a:off x="1097280" y="1591732"/>
+            <a:ext cx="10058400" cy="4640817"/>
+          </a:xfrm>
+        </p:spPr>
+        <p:txBody>
+          <a:bodyPr/>
+          <a:lstStyle/>
+          <a:p>
+            <a:r>
+              <a:rPr lang="en-US" dirty="0" smtClean="0"/>
+              <a:t> [</a:t>
+            </a:r>
+            <a:r>
+              <a:rPr lang="en-US" dirty="0"/>
+              <a:t>R5] A user must be logged into the system to perform any action except registering and logging in.</a:t>
+            </a:r>
+          </a:p>
+          <a:p>
+            <a:r>
+              <a:rPr lang="en-US" dirty="0" smtClean="0"/>
+              <a:t> [</a:t>
+            </a:r>
+            <a:r>
+              <a:rPr lang="en-US" dirty="0"/>
+              <a:t>R11] Each meeting has at least two participants.</a:t>
+            </a:r>
+          </a:p>
+          <a:p>
+            <a:r>
+              <a:rPr lang="en-US" dirty="0" smtClean="0"/>
+              <a:t> [</a:t>
+            </a:r>
+            <a:r>
+              <a:rPr lang="en-US" dirty="0"/>
+              <a:t>R12] Each meeting has at least one administrator.</a:t>
+            </a:r>
+          </a:p>
+          <a:p>
+            <a:r>
+              <a:rPr lang="en-US" dirty="0" smtClean="0"/>
+              <a:t> [</a:t>
+            </a:r>
+            <a:r>
+              <a:rPr lang="en-US" dirty="0"/>
+              <a:t>R13] Each meeting has a title, a date and a location.</a:t>
+            </a:r>
+          </a:p>
+          <a:p>
+            <a:r>
+              <a:rPr lang="en-US" dirty="0" smtClean="0"/>
+              <a:t> [</a:t>
+            </a:r>
+            <a:r>
+              <a:rPr lang="en-US" dirty="0"/>
+              <a:t>R14] Each participant in a meeting can access shared files and the chat.</a:t>
+            </a:r>
+          </a:p>
+          <a:p>
+            <a:r>
+              <a:rPr lang="en-US" dirty="0" smtClean="0"/>
+              <a:t> [</a:t>
+            </a:r>
+            <a:r>
+              <a:rPr lang="en-US" dirty="0"/>
+              <a:t>R15] Users participate in a meeting if and only if they accept the invitation.</a:t>
+            </a:r>
+          </a:p>
+          <a:p>
+            <a:r>
+              <a:rPr lang="en-US" dirty="0" smtClean="0"/>
+              <a:t> [</a:t>
+            </a:r>
+            <a:r>
+              <a:rPr lang="en-US" dirty="0"/>
+              <a:t>R16] Users do not participate in a meeting if they decline the invitation.</a:t>
+            </a:r>
+          </a:p>
+          <a:p>
+            <a:r>
+              <a:rPr lang="en-US" dirty="0" smtClean="0"/>
+              <a:t> [</a:t>
+            </a:r>
+            <a:r>
+              <a:rPr lang="en-US" dirty="0"/>
+              <a:t>R17] Users can write in the chat of a meeting if and only if they have received and accepted an invitation to it.</a:t>
+            </a:r>
+            <a:endParaRPr lang="it-IT" dirty="0"/>
+          </a:p>
+          <a:p>
+            <a:endParaRPr lang="it-IT" dirty="0"/>
+          </a:p>
+        </p:txBody>
+      </p:sp>
     </p:spTree>
     <p:extLst>
       <p:ext uri="{BB962C8B-B14F-4D97-AF65-F5344CB8AC3E}">
-        <p14:creationId xmlns:p14="http://schemas.microsoft.com/office/powerpoint/2010/main" xmlns="" val="1068353532"/>
+        <p14:creationId xmlns:p14="http://schemas.microsoft.com/office/powerpoint/2010/main" val="202697716"/>
       </p:ext>
     </p:extLst>
   </p:cSld>
@@ -10313,9 +9992,67 @@
             <a:pPr algn="ctr"/>
             <a:r>
               <a:rPr lang="en-US" dirty="0" smtClean="0"/>
-              <a:t>Allow a user to create a meeting</a:t>
-            </a:r>
-            <a:endParaRPr lang="it-IT" dirty="0"/>
+              <a:t>Allow a user to specify flexible breaks</a:t>
+            </a:r>
+          </a:p>
+        </p:txBody>
+      </p:sp>
+      <p:sp>
+        <p:nvSpPr>
+          <p:cNvPr id="3" name="Segnaposto contenuto 2"/>
+          <p:cNvSpPr>
+            <a:spLocks noGrp="1"/>
+          </p:cNvSpPr>
+          <p:nvPr>
+            <p:ph idx="1"/>
+          </p:nvPr>
+        </p:nvSpPr>
+        <p:spPr/>
+        <p:txBody>
+          <a:bodyPr anchor="ctr"/>
+          <a:lstStyle/>
+          <a:p>
+            <a:r>
+              <a:rPr lang="en-US"/>
+              <a:t> [R5] A user must be logged into the system to perform any action except registering </a:t>
+            </a:r>
+            <a:r>
+              <a:rPr lang="en-US" smtClean="0"/>
+              <a:t>and </a:t>
+            </a:r>
+            <a:r>
+              <a:rPr lang="it-IT" err="1" smtClean="0"/>
+              <a:t>logging</a:t>
+            </a:r>
+            <a:r>
+              <a:rPr lang="it-IT" smtClean="0"/>
+              <a:t> </a:t>
+            </a:r>
+            <a:r>
+              <a:rPr lang="it-IT"/>
+              <a:t>in.</a:t>
+            </a:r>
+          </a:p>
+          <a:p>
+            <a:r>
+              <a:rPr lang="en-US"/>
+              <a:t> [R18] The system suggests you a time, according to your settings, to have a break such </a:t>
+            </a:r>
+            <a:r>
+              <a:rPr lang="en-US" smtClean="0"/>
+              <a:t>that no </a:t>
+            </a:r>
+            <a:r>
+              <a:rPr lang="en-US"/>
+              <a:t>meeting overlaps with it; if no time slot is valid, a warning is generated.</a:t>
+            </a:r>
+          </a:p>
+          <a:p>
+            <a:r>
+              <a:rPr lang="en-US"/>
+              <a:t> [D6] Users can have lunch everywhere.</a:t>
+            </a:r>
+            <a:endParaRPr lang="it-IT"/>
           </a:p>
         </p:txBody>
       </p:sp>
@@ -10343,115 +10080,10 @@
           </a:p>
         </p:txBody>
       </p:sp>
-      <p:sp>
-        <p:nvSpPr>
-          <p:cNvPr id="4" name="Segnaposto contenuto 3"/>
-          <p:cNvSpPr>
-            <a:spLocks noGrp="1"/>
-          </p:cNvSpPr>
-          <p:nvPr>
-            <p:ph idx="1"/>
-          </p:nvPr>
-        </p:nvSpPr>
-        <p:spPr>
-          <a:xfrm>
-            <a:off x="1097280" y="1591732"/>
-            <a:ext cx="10058400" cy="4640817"/>
-          </a:xfrm>
-        </p:spPr>
-        <p:txBody>
-          <a:bodyPr/>
-          <a:lstStyle/>
-          <a:p>
-            <a:r>
-              <a:rPr lang="en-US" dirty="0" smtClean="0"/>
-              <a:t> [</a:t>
-            </a:r>
-            <a:r>
-              <a:rPr lang="en-US" dirty="0"/>
-              <a:t>R5] A user must be logged into the system to perform any action except registering and logging in.</a:t>
-            </a:r>
-          </a:p>
-          <a:p>
-            <a:r>
-              <a:rPr lang="en-US" dirty="0" smtClean="0"/>
-              <a:t> [</a:t>
-            </a:r>
-            <a:r>
-              <a:rPr lang="en-US" dirty="0"/>
-              <a:t>R11] Each meeting has at least two participants.</a:t>
-            </a:r>
-          </a:p>
-          <a:p>
-            <a:r>
-              <a:rPr lang="en-US" dirty="0" smtClean="0"/>
-              <a:t> [</a:t>
-            </a:r>
-            <a:r>
-              <a:rPr lang="en-US" dirty="0"/>
-              <a:t>R12] Each meeting has at least one administrator.</a:t>
-            </a:r>
-          </a:p>
-          <a:p>
-            <a:r>
-              <a:rPr lang="en-US" dirty="0" smtClean="0"/>
-              <a:t> [</a:t>
-            </a:r>
-            <a:r>
-              <a:rPr lang="en-US" dirty="0"/>
-              <a:t>R13] Each meeting has a title, a date and a location.</a:t>
-            </a:r>
-          </a:p>
-          <a:p>
-            <a:r>
-              <a:rPr lang="en-US" dirty="0" smtClean="0"/>
-              <a:t> [</a:t>
-            </a:r>
-            <a:r>
-              <a:rPr lang="en-US" dirty="0"/>
-              <a:t>R14] Each participant in a meeting can access shared files and the chat.</a:t>
-            </a:r>
-          </a:p>
-          <a:p>
-            <a:r>
-              <a:rPr lang="en-US" dirty="0" smtClean="0"/>
-              <a:t> [</a:t>
-            </a:r>
-            <a:r>
-              <a:rPr lang="en-US" dirty="0"/>
-              <a:t>R15] Users participate in a meeting if and only if they accept the invitation.</a:t>
-            </a:r>
-          </a:p>
-          <a:p>
-            <a:r>
-              <a:rPr lang="en-US" dirty="0" smtClean="0"/>
-              <a:t> [</a:t>
-            </a:r>
-            <a:r>
-              <a:rPr lang="en-US" dirty="0"/>
-              <a:t>R16] Users do not participate in a meeting if they decline the invitation.</a:t>
-            </a:r>
-          </a:p>
-          <a:p>
-            <a:r>
-              <a:rPr lang="en-US" dirty="0" smtClean="0"/>
-              <a:t> [</a:t>
-            </a:r>
-            <a:r>
-              <a:rPr lang="en-US" dirty="0"/>
-              <a:t>R17] Users can write in the chat of a meeting if and only if they have received and accepted an invitation to it.</a:t>
-            </a:r>
-            <a:endParaRPr lang="it-IT" dirty="0"/>
-          </a:p>
-          <a:p>
-            <a:endParaRPr lang="it-IT" dirty="0"/>
-          </a:p>
-        </p:txBody>
-      </p:sp>
     </p:spTree>
     <p:extLst>
       <p:ext uri="{BB962C8B-B14F-4D97-AF65-F5344CB8AC3E}">
-        <p14:creationId xmlns:p14="http://schemas.microsoft.com/office/powerpoint/2010/main" xmlns="" val="202697716"/>
+        <p14:creationId xmlns:p14="http://schemas.microsoft.com/office/powerpoint/2010/main" val="2700751322"/>
       </p:ext>
     </p:extLst>
   </p:cSld>
@@ -10487,100 +10119,6 @@
       </p:grpSpPr>
       <p:sp>
         <p:nvSpPr>
-          <p:cNvPr id="2" name="Titolo 1"/>
-          <p:cNvSpPr>
-            <a:spLocks noGrp="1"/>
-          </p:cNvSpPr>
-          <p:nvPr>
-            <p:ph type="title"/>
-          </p:nvPr>
-        </p:nvSpPr>
-        <p:spPr>
-          <a:xfrm>
-            <a:off x="0" y="-444791"/>
-            <a:ext cx="12192000" cy="1450757"/>
-          </a:xfrm>
-        </p:spPr>
-        <p:txBody>
-          <a:bodyPr>
-            <a:normAutofit/>
-          </a:bodyPr>
-          <a:lstStyle/>
-          <a:p>
-            <a:pPr algn="ctr"/>
-            <a:r>
-              <a:rPr lang="en-US" dirty="0" smtClean="0"/>
-              <a:t>Allow a user to specify </a:t>
-            </a:r>
-            <a:r>
-              <a:rPr lang="en-US" dirty="0" smtClean="0"/>
-              <a:t>flexible breaks</a:t>
-            </a:r>
-            <a:endParaRPr lang="en-US" dirty="0" smtClean="0"/>
-          </a:p>
-        </p:txBody>
-      </p:sp>
-      <p:sp>
-        <p:nvSpPr>
-          <p:cNvPr id="3" name="Segnaposto contenuto 2"/>
-          <p:cNvSpPr>
-            <a:spLocks noGrp="1"/>
-          </p:cNvSpPr>
-          <p:nvPr>
-            <p:ph idx="1"/>
-          </p:nvPr>
-        </p:nvSpPr>
-        <p:spPr/>
-        <p:txBody>
-          <a:bodyPr anchor="ctr"/>
-          <a:lstStyle/>
-          <a:p>
-            <a:r>
-              <a:rPr lang="en-US"/>
-              <a:t> [R5] A user must be logged into the system to perform any action except registering </a:t>
-            </a:r>
-            <a:r>
-              <a:rPr lang="en-US" smtClean="0"/>
-              <a:t>and </a:t>
-            </a:r>
-            <a:r>
-              <a:rPr lang="it-IT" err="1" smtClean="0"/>
-              <a:t>logging</a:t>
-            </a:r>
-            <a:r>
-              <a:rPr lang="it-IT" smtClean="0"/>
-              <a:t> </a:t>
-            </a:r>
-            <a:r>
-              <a:rPr lang="it-IT"/>
-              <a:t>in.</a:t>
-            </a:r>
-          </a:p>
-          <a:p>
-            <a:r>
-              <a:rPr lang="en-US"/>
-              <a:t> [R18] The system suggests you a time, according to your settings, to have a break such </a:t>
-            </a:r>
-            <a:r>
-              <a:rPr lang="en-US" smtClean="0"/>
-              <a:t>that no </a:t>
-            </a:r>
-            <a:r>
-              <a:rPr lang="en-US"/>
-              <a:t>meeting overlaps with it; if no time slot is valid, a warning is generated.</a:t>
-            </a:r>
-          </a:p>
-          <a:p>
-            <a:r>
-              <a:rPr lang="en-US"/>
-              <a:t> [D6] Users can have lunch everywhere.</a:t>
-            </a:r>
-            <a:endParaRPr lang="it-IT"/>
-          </a:p>
-        </p:txBody>
-      </p:sp>
-      <p:sp>
-        <p:nvSpPr>
           <p:cNvPr id="5" name="Segnaposto numero diapositiva 4"/>
           <p:cNvSpPr>
             <a:spLocks noGrp="1"/>
@@ -10603,10 +10141,110 @@
           </a:p>
         </p:txBody>
       </p:sp>
+      <p:sp>
+        <p:nvSpPr>
+          <p:cNvPr id="8" name="Titolo 7"/>
+          <p:cNvSpPr>
+            <a:spLocks noGrp="1"/>
+          </p:cNvSpPr>
+          <p:nvPr>
+            <p:ph type="title"/>
+          </p:nvPr>
+        </p:nvSpPr>
+        <p:spPr>
+          <a:xfrm>
+            <a:off x="0" y="-468000"/>
+            <a:ext cx="12192000" cy="1450757"/>
+          </a:xfrm>
+        </p:spPr>
+        <p:txBody>
+          <a:bodyPr>
+            <a:normAutofit/>
+          </a:bodyPr>
+          <a:lstStyle/>
+          <a:p>
+            <a:pPr algn="ctr"/>
+            <a:r>
+              <a:rPr lang="en-US" dirty="0"/>
+              <a:t>Manage users’ </a:t>
+            </a:r>
+            <a:r>
+              <a:rPr lang="en-US" dirty="0" smtClean="0"/>
+              <a:t>travels</a:t>
+            </a:r>
+            <a:endParaRPr lang="it-IT" dirty="0"/>
+          </a:p>
+        </p:txBody>
+      </p:sp>
+      <p:sp>
+        <p:nvSpPr>
+          <p:cNvPr id="9" name="Segnaposto contenuto 8"/>
+          <p:cNvSpPr>
+            <a:spLocks noGrp="1"/>
+          </p:cNvSpPr>
+          <p:nvPr>
+            <p:ph idx="1"/>
+          </p:nvPr>
+        </p:nvSpPr>
+        <p:spPr>
+          <a:xfrm>
+            <a:off x="1097280" y="1873955"/>
+            <a:ext cx="10058400" cy="4358593"/>
+          </a:xfrm>
+        </p:spPr>
+        <p:txBody>
+          <a:bodyPr/>
+          <a:lstStyle/>
+          <a:p>
+            <a:r>
+              <a:rPr lang="en-US" dirty="0" smtClean="0"/>
+              <a:t> G8.1 </a:t>
+            </a:r>
+            <a:r>
+              <a:rPr lang="en-US" dirty="0"/>
+              <a:t>Allow a user to create a preference list and constraints about the way he wants to travel.</a:t>
+            </a:r>
+          </a:p>
+          <a:p>
+            <a:endParaRPr lang="en-US" dirty="0"/>
+          </a:p>
+          <a:p>
+            <a:r>
+              <a:rPr lang="en-US" dirty="0"/>
+              <a:t> [R5] A user must be logged into the system to perform any action except registering and </a:t>
+            </a:r>
+            <a:r>
+              <a:rPr lang="it-IT" dirty="0" err="1"/>
+              <a:t>logging</a:t>
+            </a:r>
+            <a:r>
+              <a:rPr lang="it-IT" dirty="0"/>
+              <a:t> in.</a:t>
+            </a:r>
+          </a:p>
+          <a:p>
+            <a:r>
+              <a:rPr lang="en-US" dirty="0"/>
+              <a:t> [R19] At least one travel mean is available in the preference list.</a:t>
+            </a:r>
+          </a:p>
+          <a:p>
+            <a:r>
+              <a:rPr lang="en-US" dirty="0"/>
+              <a:t> [R20] The travel mean suggested by the system is always the first in the weighted preference list that satisfied all the constraints; if no travel mean satisfied all the constraints than the system suggests the fastest one</a:t>
+            </a:r>
+            <a:r>
+              <a:rPr lang="en-US" dirty="0" smtClean="0"/>
+              <a:t>.</a:t>
+            </a:r>
+            <a:endParaRPr lang="en-US" dirty="0"/>
+          </a:p>
+        </p:txBody>
+      </p:sp>
     </p:spTree>
     <p:extLst>
       <p:ext uri="{BB962C8B-B14F-4D97-AF65-F5344CB8AC3E}">
-        <p14:creationId xmlns:p14="http://schemas.microsoft.com/office/powerpoint/2010/main" xmlns="" val="2700751322"/>
+        <p14:creationId xmlns:p14="http://schemas.microsoft.com/office/powerpoint/2010/main" val="2407907090"/>
       </p:ext>
     </p:extLst>
   </p:cSld>
@@ -11093,7 +10731,7 @@
   <a:extraClrSchemeLst/>
   <a:extLst>
     <a:ext uri="{05A4C25C-085E-4340-85A3-A5531E510DB2}">
-      <thm15:themeFamily xmlns:thm15="http://schemas.microsoft.com/office/thememl/2012/main" xmlns="" name="Retrospect" id="{5F128B03-DCCA-4EEB-AB3B-CF2899314A46}" vid="{3F1AAB62-24C6-49D2-8E01-B56FAC9A3DCD}"/>
+      <thm15:themeFamily xmlns:thm15="http://schemas.microsoft.com/office/thememl/2012/main" name="Retrospect" id="{5F128B03-DCCA-4EEB-AB3B-CF2899314A46}" vid="{3F1AAB62-24C6-49D2-8E01-B56FAC9A3DCD}"/>
     </a:ext>
   </a:extLst>
 </a:theme>
@@ -11354,7 +10992,7 @@
   <a:extraClrSchemeLst/>
   <a:extLst>
     <a:ext uri="{05A4C25C-085E-4340-85A3-A5531E510DB2}">
-      <thm15:themeFamily xmlns:thm15="http://schemas.microsoft.com/office/thememl/2012/main" xmlns="" name="Office Theme" id="{62F939B6-93AF-4DB8-9C6B-D6C7DFDC589F}" vid="{4A3C46E8-61CC-4603-A589-7422A47A8E4A}"/>
+      <thm15:themeFamily xmlns:thm15="http://schemas.microsoft.com/office/thememl/2012/main" name="Office Theme" id="{62F939B6-93AF-4DB8-9C6B-D6C7DFDC589F}" vid="{4A3C46E8-61CC-4603-A589-7422A47A8E4A}"/>
     </a:ext>
   </a:extLst>
 </a:theme>

</xml_diff>

<commit_message>
edit presentation in according to RASD modifications
</commit_message>
<xml_diff>
--- a/RASD/Presentation/RASD.pptx
+++ b/RASD/Presentation/RASD.pptx
@@ -569,6 +569,133 @@
     <p:extLst>
       <p:ext uri="{BB962C8B-B14F-4D97-AF65-F5344CB8AC3E}">
         <p14:creationId xmlns:p14="http://schemas.microsoft.com/office/powerpoint/2010/main" val="1665066930"/>
+      </p:ext>
+    </p:extLst>
+  </p:cSld>
+  <p:clrMapOvr>
+    <a:masterClrMapping/>
+  </p:clrMapOvr>
+</p:notes>
+</file>
+
+<file path=ppt/notesSlides/notesSlide2.xml><?xml version="1.0" encoding="utf-8"?>
+<p:notes xmlns:a="http://schemas.openxmlformats.org/drawingml/2006/main" xmlns:r="http://schemas.openxmlformats.org/officeDocument/2006/relationships" xmlns:p="http://schemas.openxmlformats.org/presentationml/2006/main">
+  <p:cSld>
+    <p:spTree>
+      <p:nvGrpSpPr>
+        <p:cNvPr id="1" name=""/>
+        <p:cNvGrpSpPr/>
+        <p:nvPr/>
+      </p:nvGrpSpPr>
+      <p:grpSpPr>
+        <a:xfrm>
+          <a:off x="0" y="0"/>
+          <a:ext cx="0" cy="0"/>
+          <a:chOff x="0" y="0"/>
+          <a:chExt cx="0" cy="0"/>
+        </a:xfrm>
+      </p:grpSpPr>
+      <p:sp>
+        <p:nvSpPr>
+          <p:cNvPr id="2" name="Segnaposto immagine diapositiva 1"/>
+          <p:cNvSpPr>
+            <a:spLocks noGrp="1" noRot="1" noChangeAspect="1"/>
+          </p:cNvSpPr>
+          <p:nvPr>
+            <p:ph type="sldImg"/>
+          </p:nvPr>
+        </p:nvSpPr>
+        <p:spPr/>
+      </p:sp>
+      <p:sp>
+        <p:nvSpPr>
+          <p:cNvPr id="3" name="Segnaposto note 2"/>
+          <p:cNvSpPr>
+            <a:spLocks noGrp="1"/>
+          </p:cNvSpPr>
+          <p:nvPr>
+            <p:ph type="body" idx="1"/>
+          </p:nvPr>
+        </p:nvSpPr>
+        <p:spPr/>
+        <p:txBody>
+          <a:bodyPr/>
+          <a:lstStyle/>
+          <a:p>
+            <a:r>
+              <a:rPr lang="en-US" dirty="0" smtClean="0"/>
+              <a:t>How many</a:t>
+            </a:r>
+            <a:r>
+              <a:rPr lang="en-US" baseline="0" dirty="0" smtClean="0"/>
+              <a:t> breaks the user want</a:t>
+            </a:r>
+          </a:p>
+          <a:p>
+            <a:r>
+              <a:rPr lang="en-US" dirty="0" smtClean="0"/>
+              <a:t>It has duration, start time, end time and a default</a:t>
+            </a:r>
+            <a:r>
+              <a:rPr lang="en-US" baseline="0" dirty="0" smtClean="0"/>
+              <a:t> time.</a:t>
+            </a:r>
+          </a:p>
+          <a:p>
+            <a:r>
+              <a:rPr lang="en-US" dirty="0" smtClean="0"/>
+              <a:t>It</a:t>
+            </a:r>
+            <a:r>
+              <a:rPr lang="en-US" baseline="0" dirty="0" smtClean="0"/>
+              <a:t> has a Boolean is doable that says there is a time space long as the duration between start time and end time. If it is false it means that there are one or more meeting that prevent the user to take its break. As we can prove through the alloy model if there is a break that is not doable it means that there must be at least one meeting that is inconsistent. Only after </a:t>
+            </a:r>
+            <a:r>
+              <a:rPr lang="en-US" baseline="0" dirty="0" err="1" smtClean="0"/>
+              <a:t>resoving</a:t>
+            </a:r>
+            <a:r>
+              <a:rPr lang="en-US" baseline="0" dirty="0" smtClean="0"/>
+              <a:t> pending meetings or breaks (it could be possible to say: I’ll not have this break), the break will become doable.</a:t>
+            </a:r>
+          </a:p>
+          <a:p>
+            <a:r>
+              <a:rPr lang="en-US" baseline="0" dirty="0" smtClean="0"/>
+              <a:t>We have taken the assumption that the user can have </a:t>
+            </a:r>
+            <a:endParaRPr lang="en-US" dirty="0"/>
+          </a:p>
+        </p:txBody>
+      </p:sp>
+      <p:sp>
+        <p:nvSpPr>
+          <p:cNvPr id="4" name="Segnaposto numero diapositiva 3"/>
+          <p:cNvSpPr>
+            <a:spLocks noGrp="1"/>
+          </p:cNvSpPr>
+          <p:nvPr>
+            <p:ph type="sldNum" sz="quarter" idx="10"/>
+          </p:nvPr>
+        </p:nvSpPr>
+        <p:spPr/>
+        <p:txBody>
+          <a:bodyPr/>
+          <a:lstStyle/>
+          <a:p>
+            <a:fld id="{932AFBF0-253E-4873-9876-7E283709A40E}" type="slidenum">
+              <a:rPr lang="it-IT" smtClean="0"/>
+              <a:pPr/>
+              <a:t>8</a:t>
+            </a:fld>
+            <a:endParaRPr lang="it-IT"/>
+          </a:p>
+        </p:txBody>
+      </p:sp>
+    </p:spTree>
+    <p:extLst>
+      <p:ext uri="{BB962C8B-B14F-4D97-AF65-F5344CB8AC3E}">
+        <p14:creationId xmlns:p14="http://schemas.microsoft.com/office/powerpoint/2010/main" val="2032719581"/>
       </p:ext>
     </p:extLst>
   </p:cSld>
@@ -8638,17 +8765,8 @@
             </a:r>
             <a:r>
               <a:rPr lang="en-GB" sz="2400" dirty="0" smtClean="0"/>
-              <a:t>date </a:t>
-            </a:r>
-            <a:r>
-              <a:rPr lang="en-GB" sz="2400" dirty="0" smtClean="0"/>
-              <a:t>and </a:t>
-            </a:r>
-            <a:r>
-              <a:rPr lang="en-GB" sz="2400" dirty="0" smtClean="0"/>
-              <a:t>location</a:t>
-            </a:r>
-            <a:endParaRPr lang="en-GB" sz="2400" dirty="0" smtClean="0"/>
+              <a:t>date and location</a:t>
+            </a:r>
           </a:p>
           <a:p>
             <a:r>
@@ -9116,89 +9234,49 @@
           <a:p>
             <a:r>
               <a:rPr lang="en-US" dirty="0" smtClean="0"/>
-              <a:t> G1 </a:t>
-            </a:r>
+              <a:t> G1 Allow someone to visit the homepage of the system and to register himself providing a valid email, a password and a unique nickname. As an alternative, an external login provider, such as Google+, can be used.</a:t>
+            </a:r>
+          </a:p>
+          <a:p>
             <a:r>
               <a:rPr lang="en-US" dirty="0" smtClean="0"/>
-              <a:t>Allow someone to visit the homepage of the system and to register himself providing a valid email, a password and a unique nickname. As an alternative, an external login provider, such as Google+, can be used.</a:t>
+              <a:t> G2 Users can log into the system.</a:t>
             </a:r>
           </a:p>
           <a:p>
             <a:r>
               <a:rPr lang="en-US" dirty="0" smtClean="0"/>
-              <a:t> G2 </a:t>
-            </a:r>
+              <a:t> G3 Allow a user to visit its profile and to see a detailed schedule of any day containing all the meetings he is attending and all the travels the system has planned him.</a:t>
+            </a:r>
+          </a:p>
+          <a:p>
             <a:r>
               <a:rPr lang="en-US" dirty="0" smtClean="0"/>
-              <a:t>Users can log into the system.</a:t>
+              <a:t> G4 Allow a user to edit all information in its profile (e.g. displayed name, phone number, company, website, social accounts).</a:t>
             </a:r>
           </a:p>
           <a:p>
             <a:r>
               <a:rPr lang="en-US" dirty="0" smtClean="0"/>
-              <a:t> G3 </a:t>
-            </a:r>
+              <a:t> G5 Allow a user to create a meeting and to invite other users to attend it.</a:t>
+            </a:r>
+          </a:p>
+          <a:p>
             <a:r>
               <a:rPr lang="en-US" dirty="0" smtClean="0"/>
-              <a:t>Allow a user to visit its profile and to see a detailed schedule of any day containing all the meetings he is attending and all the travels the system has planned him.</a:t>
+              <a:t> G6 Create a warning each time it is not possible to reach a meeting location from the previous one in time.</a:t>
             </a:r>
           </a:p>
           <a:p>
             <a:r>
               <a:rPr lang="en-US" dirty="0" smtClean="0"/>
-              <a:t> G4 </a:t>
-            </a:r>
+              <a:t> G7 Allow a user to specify flexible breaks during the day.</a:t>
+            </a:r>
+          </a:p>
+          <a:p>
             <a:r>
               <a:rPr lang="en-US" dirty="0" smtClean="0"/>
-              <a:t>Allow a user to edit all information in its profile (e.g. displayed name, phone number, company</a:t>
-            </a:r>
-            <a:r>
-              <a:rPr lang="en-US" dirty="0" smtClean="0"/>
-              <a:t>, website</a:t>
-            </a:r>
-            <a:r>
-              <a:rPr lang="en-US" dirty="0" smtClean="0"/>
-              <a:t>, social accounts).</a:t>
-            </a:r>
-          </a:p>
-          <a:p>
-            <a:r>
-              <a:rPr lang="en-US" dirty="0" smtClean="0"/>
-              <a:t> G5 </a:t>
-            </a:r>
-            <a:r>
-              <a:rPr lang="en-US" dirty="0" smtClean="0"/>
-              <a:t>Allow a user to create a meeting and to invite other users to attend it.</a:t>
-            </a:r>
-          </a:p>
-          <a:p>
-            <a:r>
-              <a:rPr lang="en-US" dirty="0" smtClean="0"/>
-              <a:t> G6 </a:t>
-            </a:r>
-            <a:r>
-              <a:rPr lang="en-US" dirty="0" smtClean="0"/>
-              <a:t>Create a warning each time it is not possible to reach a meeting location from the previous one in time.</a:t>
-            </a:r>
-          </a:p>
-          <a:p>
-            <a:r>
-              <a:rPr lang="en-US" dirty="0" smtClean="0"/>
-              <a:t> G7 </a:t>
-            </a:r>
-            <a:r>
-              <a:rPr lang="en-US" dirty="0" smtClean="0"/>
-              <a:t>Allow a user to specify flexible breaks during the day.</a:t>
-            </a:r>
-          </a:p>
-          <a:p>
-            <a:r>
-              <a:rPr lang="en-US" dirty="0" smtClean="0"/>
-              <a:t> G8 </a:t>
-            </a:r>
-            <a:r>
-              <a:rPr lang="en-US" dirty="0" smtClean="0"/>
-              <a:t>Manage users’ travels between subsequent meetings, suggesting the best mobility option according to their preference list.</a:t>
+              <a:t> G8 Manage users’ travels between subsequent meetings, suggesting the best mobility option according to their preference list.</a:t>
             </a:r>
             <a:endParaRPr lang="it-IT" dirty="0"/>
           </a:p>
@@ -9313,89 +9391,49 @@
           <a:p>
             <a:r>
               <a:rPr lang="en-US" dirty="0" smtClean="0"/>
-              <a:t> G1 </a:t>
-            </a:r>
+              <a:t> G1 Allow someone to visit the homepage of the system and to register himself providing a valid email, a password and a unique nickname. As an alternative, an external login provider, such as Google+, can be used.</a:t>
+            </a:r>
+          </a:p>
+          <a:p>
             <a:r>
               <a:rPr lang="en-US" dirty="0" smtClean="0"/>
-              <a:t>Allow someone to visit the homepage of the system and to register himself providing a valid </a:t>
-            </a:r>
+              <a:t> G2 Users can log into the system.</a:t>
+            </a:r>
+          </a:p>
+          <a:p>
             <a:r>
               <a:rPr lang="en-US" dirty="0" smtClean="0"/>
-              <a:t>email</a:t>
-            </a:r>
+              <a:t> G3 Allow a user to visit its profile and to see a detailed schedule of any day containing all the meetings he is attending and all the travels the system has planned him.</a:t>
+            </a:r>
+          </a:p>
+          <a:p>
             <a:r>
               <a:rPr lang="en-US" dirty="0" smtClean="0"/>
-              <a:t>, a password and a unique nickname. As an alternative, an external login provider, such as Google+, can be used.</a:t>
+              <a:t> G4 Allow a user to edit all information in its profile (e.g. displayed name, phone number, company, website, social accounts).</a:t>
+            </a:r>
+          </a:p>
+          <a:p>
+            <a:r>
+              <a:rPr lang="en-US" b="1" dirty="0" smtClean="0"/>
+              <a:t> G5 Allow a user to create a meeting and to invite other users to attend it.</a:t>
             </a:r>
           </a:p>
           <a:p>
             <a:r>
               <a:rPr lang="en-US" dirty="0" smtClean="0"/>
-              <a:t> G2 </a:t>
-            </a:r>
-            <a:r>
-              <a:rPr lang="en-US" dirty="0" smtClean="0"/>
-              <a:t>Users can log into the system.</a:t>
-            </a:r>
-          </a:p>
-          <a:p>
-            <a:r>
-              <a:rPr lang="en-US" dirty="0" smtClean="0"/>
-              <a:t> G3 </a:t>
-            </a:r>
-            <a:r>
-              <a:rPr lang="en-US" dirty="0" smtClean="0"/>
-              <a:t>Allow a user to visit its profile and to see a detailed schedule of any day containing all the meetings he is attending and all the travels the system has planned him.</a:t>
-            </a:r>
-          </a:p>
-          <a:p>
-            <a:r>
-              <a:rPr lang="en-US" dirty="0" smtClean="0"/>
-              <a:t> G4 </a:t>
-            </a:r>
-            <a:r>
-              <a:rPr lang="en-US" dirty="0" smtClean="0"/>
-              <a:t>Allow a user to edit all information in its profile (e.g. displayed name, phone number, company, website, social accounts).</a:t>
+              <a:t> G6 Create a warning each time it is not possible to reach a meeting location from the previous one in time.</a:t>
             </a:r>
           </a:p>
           <a:p>
             <a:r>
               <a:rPr lang="en-US" b="1" dirty="0" smtClean="0"/>
-              <a:t> G5 </a:t>
-            </a:r>
+              <a:t> G7 Allow a user to specify flexible breaks during the day.</a:t>
+            </a:r>
+          </a:p>
+          <a:p>
             <a:r>
               <a:rPr lang="en-US" b="1" dirty="0" smtClean="0"/>
-              <a:t>Allow a user to create a meeting and to invite other users to attend it.</a:t>
-            </a:r>
-          </a:p>
-          <a:p>
-            <a:r>
-              <a:rPr lang="en-US" dirty="0" smtClean="0"/>
-              <a:t> G6 </a:t>
-            </a:r>
-            <a:r>
-              <a:rPr lang="en-US" dirty="0" smtClean="0"/>
-              <a:t>Create a warning each time it is not possible to reach a meeting location from the previous one in time.</a:t>
-            </a:r>
-          </a:p>
-          <a:p>
-            <a:r>
-              <a:rPr lang="en-US" b="1" dirty="0" smtClean="0"/>
-              <a:t> G7 </a:t>
-            </a:r>
-            <a:r>
-              <a:rPr lang="en-US" b="1" dirty="0" smtClean="0"/>
-              <a:t>Allow a user to specify flexible breaks during the day.</a:t>
-            </a:r>
-          </a:p>
-          <a:p>
-            <a:r>
-              <a:rPr lang="en-US" b="1" dirty="0" smtClean="0"/>
-              <a:t> G8 </a:t>
-            </a:r>
-            <a:r>
-              <a:rPr lang="en-US" b="1" dirty="0" smtClean="0"/>
-              <a:t>Manage users’ travels between subsequent meetings, suggesting the best mobility option according to their preference list</a:t>
+              <a:t> G8 Manage users’ travels between subsequent meetings, suggesting the best mobility option according to their preference list</a:t>
             </a:r>
             <a:r>
               <a:rPr lang="en-US" dirty="0" smtClean="0"/>
@@ -10013,46 +10051,55 @@
           <a:lstStyle/>
           <a:p>
             <a:r>
-              <a:rPr lang="en-US"/>
-              <a:t> [R5] A user must be logged into the system to perform any action except registering </a:t>
-            </a:r>
-            <a:r>
-              <a:rPr lang="en-US" smtClean="0"/>
-              <a:t>and </a:t>
-            </a:r>
-            <a:r>
-              <a:rPr lang="it-IT" err="1" smtClean="0"/>
+              <a:rPr lang="en-US" dirty="0"/>
+              <a:t> [R5] </a:t>
+            </a:r>
+            <a:r>
+              <a:rPr lang="en-US" dirty="0" smtClean="0"/>
+              <a:t>A user must be logged into the system to perform any action except registering and </a:t>
+            </a:r>
+            <a:r>
+              <a:rPr lang="it-IT" dirty="0" err="1" smtClean="0"/>
               <a:t>logging</a:t>
             </a:r>
             <a:r>
-              <a:rPr lang="it-IT" smtClean="0"/>
+              <a:rPr lang="it-IT" dirty="0" smtClean="0"/>
+              <a:t> in.</a:t>
+            </a:r>
+            <a:endParaRPr lang="it-IT" dirty="0"/>
+          </a:p>
+          <a:p>
+            <a:r>
+              <a:rPr lang="en-US" dirty="0"/>
+              <a:t> [R18] The system suggests you a time, according to your settings, to have a break such </a:t>
+            </a:r>
+            <a:r>
+              <a:rPr lang="en-US" dirty="0" smtClean="0"/>
+              <a:t>that no </a:t>
+            </a:r>
+            <a:r>
+              <a:rPr lang="en-US" dirty="0"/>
+              <a:t>meeting overlaps with it; if no time slot is valid, a warning is generated.</a:t>
+            </a:r>
+          </a:p>
+          <a:p>
+            <a:r>
+              <a:rPr lang="en-US" dirty="0"/>
+              <a:t> [D6] Users can </a:t>
+            </a:r>
+            <a:r>
+              <a:rPr lang="en-US" dirty="0" smtClean="0"/>
+              <a:t>take a break</a:t>
+            </a:r>
+            <a:r>
+              <a:rPr lang="en-US" dirty="0" smtClean="0"/>
               <a:t> </a:t>
             </a:r>
             <a:r>
-              <a:rPr lang="it-IT"/>
-              <a:t>in.</a:t>
-            </a:r>
-          </a:p>
-          <a:p>
-            <a:r>
-              <a:rPr lang="en-US"/>
-              <a:t> [R18] The system suggests you a time, according to your settings, to have a break such </a:t>
-            </a:r>
-            <a:r>
-              <a:rPr lang="en-US" smtClean="0"/>
-              <a:t>that no </a:t>
-            </a:r>
-            <a:r>
-              <a:rPr lang="en-US"/>
-              <a:t>meeting overlaps with it; if no time slot is valid, a warning is generated.</a:t>
-            </a:r>
-          </a:p>
-          <a:p>
-            <a:r>
-              <a:rPr lang="en-US"/>
-              <a:t> [D6] Users can have lunch everywhere.</a:t>
-            </a:r>
-            <a:endParaRPr lang="it-IT"/>
+              <a:rPr lang="en-US" dirty="0"/>
+              <a:t>everywhere.</a:t>
+            </a:r>
+            <a:endParaRPr lang="it-IT" dirty="0"/>
           </a:p>
         </p:txBody>
       </p:sp>

</xml_diff>

<commit_message>
edit notes of presentation
</commit_message>
<xml_diff>
--- a/RASD/Presentation/RASD.pptx
+++ b/RASD/Presentation/RASD.pptx
@@ -622,48 +622,6 @@
           <a:bodyPr/>
           <a:lstStyle/>
           <a:p>
-            <a:r>
-              <a:rPr lang="en-US" dirty="0" smtClean="0"/>
-              <a:t>How many</a:t>
-            </a:r>
-            <a:r>
-              <a:rPr lang="en-US" baseline="0" dirty="0" smtClean="0"/>
-              <a:t> breaks the user want</a:t>
-            </a:r>
-          </a:p>
-          <a:p>
-            <a:r>
-              <a:rPr lang="en-US" dirty="0" smtClean="0"/>
-              <a:t>It has duration, start time, end time and a default</a:t>
-            </a:r>
-            <a:r>
-              <a:rPr lang="en-US" baseline="0" dirty="0" smtClean="0"/>
-              <a:t> time.</a:t>
-            </a:r>
-          </a:p>
-          <a:p>
-            <a:r>
-              <a:rPr lang="en-US" dirty="0" smtClean="0"/>
-              <a:t>It</a:t>
-            </a:r>
-            <a:r>
-              <a:rPr lang="en-US" baseline="0" dirty="0" smtClean="0"/>
-              <a:t> has a Boolean is doable that says there is a time space long as the duration between start time and end time. If it is false it means that there are one or more meeting that prevent the user to take its break. As we can prove through the alloy model if there is a break that is not doable it means that there must be at least one meeting that is inconsistent. Only after </a:t>
-            </a:r>
-            <a:r>
-              <a:rPr lang="en-US" baseline="0" dirty="0" err="1" smtClean="0"/>
-              <a:t>resoving</a:t>
-            </a:r>
-            <a:r>
-              <a:rPr lang="en-US" baseline="0" dirty="0" smtClean="0"/>
-              <a:t> pending meetings or breaks (it could be possible to say: I’ll not have this break), the break will become doable.</a:t>
-            </a:r>
-          </a:p>
-          <a:p>
-            <a:r>
-              <a:rPr lang="en-US" baseline="0" dirty="0" smtClean="0"/>
-              <a:t>We have taken the assumption that the user can have </a:t>
-            </a:r>
             <a:endParaRPr lang="en-US" dirty="0"/>
           </a:p>
         </p:txBody>
@@ -696,6 +654,91 @@
     <p:extLst>
       <p:ext uri="{BB962C8B-B14F-4D97-AF65-F5344CB8AC3E}">
         <p14:creationId xmlns:p14="http://schemas.microsoft.com/office/powerpoint/2010/main" val="2032719581"/>
+      </p:ext>
+    </p:extLst>
+  </p:cSld>
+  <p:clrMapOvr>
+    <a:masterClrMapping/>
+  </p:clrMapOvr>
+</p:notes>
+</file>
+
+<file path=ppt/notesSlides/notesSlide3.xml><?xml version="1.0" encoding="utf-8"?>
+<p:notes xmlns:a="http://schemas.openxmlformats.org/drawingml/2006/main" xmlns:r="http://schemas.openxmlformats.org/officeDocument/2006/relationships" xmlns:p="http://schemas.openxmlformats.org/presentationml/2006/main">
+  <p:cSld>
+    <p:spTree>
+      <p:nvGrpSpPr>
+        <p:cNvPr id="1" name=""/>
+        <p:cNvGrpSpPr/>
+        <p:nvPr/>
+      </p:nvGrpSpPr>
+      <p:grpSpPr>
+        <a:xfrm>
+          <a:off x="0" y="0"/>
+          <a:ext cx="0" cy="0"/>
+          <a:chOff x="0" y="0"/>
+          <a:chExt cx="0" cy="0"/>
+        </a:xfrm>
+      </p:grpSpPr>
+      <p:sp>
+        <p:nvSpPr>
+          <p:cNvPr id="2" name="Segnaposto immagine diapositiva 1"/>
+          <p:cNvSpPr>
+            <a:spLocks noGrp="1" noRot="1" noChangeAspect="1"/>
+          </p:cNvSpPr>
+          <p:nvPr>
+            <p:ph type="sldImg"/>
+          </p:nvPr>
+        </p:nvSpPr>
+        <p:spPr/>
+      </p:sp>
+      <p:sp>
+        <p:nvSpPr>
+          <p:cNvPr id="3" name="Segnaposto note 2"/>
+          <p:cNvSpPr>
+            <a:spLocks noGrp="1"/>
+          </p:cNvSpPr>
+          <p:nvPr>
+            <p:ph type="body" idx="1"/>
+          </p:nvPr>
+        </p:nvSpPr>
+        <p:spPr/>
+        <p:txBody>
+          <a:bodyPr/>
+          <a:lstStyle/>
+          <a:p>
+            <a:endParaRPr lang="en-US" dirty="0"/>
+          </a:p>
+        </p:txBody>
+      </p:sp>
+      <p:sp>
+        <p:nvSpPr>
+          <p:cNvPr id="4" name="Segnaposto numero diapositiva 3"/>
+          <p:cNvSpPr>
+            <a:spLocks noGrp="1"/>
+          </p:cNvSpPr>
+          <p:nvPr>
+            <p:ph type="sldNum" sz="quarter" idx="10"/>
+          </p:nvPr>
+        </p:nvSpPr>
+        <p:spPr/>
+        <p:txBody>
+          <a:bodyPr/>
+          <a:lstStyle/>
+          <a:p>
+            <a:fld id="{932AFBF0-253E-4873-9876-7E283709A40E}" type="slidenum">
+              <a:rPr lang="it-IT" smtClean="0"/>
+              <a:pPr/>
+              <a:t>10</a:t>
+            </a:fld>
+            <a:endParaRPr lang="it-IT"/>
+          </a:p>
+        </p:txBody>
+      </p:sp>
+    </p:spTree>
+    <p:extLst>
+      <p:ext uri="{BB962C8B-B14F-4D97-AF65-F5344CB8AC3E}">
+        <p14:creationId xmlns:p14="http://schemas.microsoft.com/office/powerpoint/2010/main" val="1132183501"/>
       </p:ext>
     </p:extLst>
   </p:cSld>
@@ -6886,7 +6929,7 @@
         <p:spPr>
           <a:xfrm>
             <a:off x="0" y="6334316"/>
-            <a:ext cx="12192001" cy="65998"/>
+            <a:ext cx="12192001" cy="73918"/>
           </a:xfrm>
           <a:prstGeom prst="rect">
             <a:avLst/>
@@ -10089,11 +10132,7 @@
             </a:r>
             <a:r>
               <a:rPr lang="en-US" dirty="0" smtClean="0"/>
-              <a:t>take a break</a:t>
-            </a:r>
-            <a:r>
-              <a:rPr lang="en-US" dirty="0" smtClean="0"/>
-              <a:t> </a:t>
+              <a:t>take a break </a:t>
             </a:r>
             <a:r>
               <a:rPr lang="en-US" dirty="0"/>

</xml_diff>